<commit_message>
include branch predictor in diagram
</commit_message>
<xml_diff>
--- a/diagram.pptx
+++ b/diagram.pptx
@@ -791,7 +791,7 @@
   <p:cSld>
     <p:spTree>
       <p:nvGrpSpPr>
-        <p:cNvPr id="160" name="Shape 160"/>
+        <p:cNvPr id="159" name="Shape 159"/>
         <p:cNvGrpSpPr/>
         <p:nvPr/>
       </p:nvGrpSpPr>
@@ -805,7 +805,7 @@
       </p:grpSpPr>
       <p:sp>
         <p:nvSpPr>
-          <p:cNvPr id="161" name="Google Shape;161;g2b2c012bd08_0_1:notes"/>
+          <p:cNvPr id="160" name="Google Shape;160;g2b2c012bd08_0_1:notes"/>
           <p:cNvSpPr/>
           <p:nvPr>
             <p:ph idx="2" type="sldImg"/>
@@ -840,7 +840,7 @@
       </p:sp>
       <p:sp>
         <p:nvSpPr>
-          <p:cNvPr id="162" name="Google Shape;162;g2b2c012bd08_0_1:notes"/>
+          <p:cNvPr id="161" name="Google Shape;161;g2b2c012bd08_0_1:notes"/>
           <p:cNvSpPr txBox="1"/>
           <p:nvPr>
             <p:ph idx="1" type="body"/>
@@ -6478,60 +6478,9 @@
           </a:p>
         </p:txBody>
       </p:sp>
-      <p:sp>
-        <p:nvSpPr>
-          <p:cNvPr id="73" name="Google Shape;73;p13"/>
-          <p:cNvSpPr/>
-          <p:nvPr/>
-        </p:nvSpPr>
-        <p:spPr>
-          <a:xfrm rot="10800000">
-            <a:off x="1591700" y="3251425"/>
-            <a:ext cx="371100" cy="78600"/>
-          </a:xfrm>
-          <a:prstGeom prst="trapezoid">
-            <a:avLst>
-              <a:gd fmla="val 127315" name="adj"/>
-            </a:avLst>
-          </a:prstGeom>
-          <a:solidFill>
-            <a:schemeClr val="lt2"/>
-          </a:solidFill>
-          <a:ln cap="flat" cmpd="sng" w="9525">
-            <a:solidFill>
-              <a:schemeClr val="dk2"/>
-            </a:solidFill>
-            <a:prstDash val="solid"/>
-            <a:round/>
-            <a:headEnd len="sm" w="sm" type="none"/>
-            <a:tailEnd len="sm" w="sm" type="none"/>
-          </a:ln>
-        </p:spPr>
-        <p:txBody>
-          <a:bodyPr anchorCtr="0" anchor="ctr" bIns="91425" lIns="91425" spcFirstLastPara="1" rIns="91425" wrap="square" tIns="91425">
-            <a:noAutofit/>
-          </a:bodyPr>
-          <a:lstStyle/>
-          <a:p>
-            <a:pPr indent="0" lvl="0" marL="0" rtl="0" algn="ctr">
-              <a:spcBef>
-                <a:spcPts val="0"/>
-              </a:spcBef>
-              <a:spcAft>
-                <a:spcPts val="0"/>
-              </a:spcAft>
-              <a:buNone/>
-            </a:pPr>
-            <a:r>
-              <a:t/>
-            </a:r>
-            <a:endParaRPr/>
-          </a:p>
-        </p:txBody>
-      </p:sp>
       <p:cxnSp>
         <p:nvCxnSpPr>
-          <p:cNvPr id="74" name="Google Shape;74;p13"/>
+          <p:cNvPr id="73" name="Google Shape;73;p13"/>
           <p:cNvCxnSpPr>
             <a:stCxn id="55" idx="0"/>
             <a:endCxn id="65" idx="1"/>
@@ -6562,7 +6511,7 @@
       </p:cxnSp>
       <p:cxnSp>
         <p:nvCxnSpPr>
-          <p:cNvPr id="75" name="Google Shape;75;p13"/>
+          <p:cNvPr id="74" name="Google Shape;74;p13"/>
           <p:cNvCxnSpPr>
             <a:endCxn id="62" idx="1"/>
           </p:cNvCxnSpPr>
@@ -6592,7 +6541,7 @@
       </p:cxnSp>
       <p:cxnSp>
         <p:nvCxnSpPr>
-          <p:cNvPr id="76" name="Google Shape;76;p13"/>
+          <p:cNvPr id="75" name="Google Shape;75;p13"/>
           <p:cNvCxnSpPr>
             <a:endCxn id="56" idx="1"/>
           </p:cNvCxnSpPr>
@@ -6622,7 +6571,7 @@
       </p:cxnSp>
       <p:cxnSp>
         <p:nvCxnSpPr>
-          <p:cNvPr id="77" name="Google Shape;77;p13"/>
+          <p:cNvPr id="76" name="Google Shape;76;p13"/>
           <p:cNvCxnSpPr/>
           <p:nvPr/>
         </p:nvCxnSpPr>
@@ -6650,7 +6599,7 @@
       </p:cxnSp>
       <p:cxnSp>
         <p:nvCxnSpPr>
-          <p:cNvPr id="78" name="Google Shape;78;p13"/>
+          <p:cNvPr id="77" name="Google Shape;77;p13"/>
           <p:cNvCxnSpPr/>
           <p:nvPr/>
         </p:nvCxnSpPr>
@@ -6676,7 +6625,7 @@
       </p:cxnSp>
       <p:cxnSp>
         <p:nvCxnSpPr>
-          <p:cNvPr id="79" name="Google Shape;79;p13"/>
+          <p:cNvPr id="78" name="Google Shape;78;p13"/>
           <p:cNvCxnSpPr/>
           <p:nvPr/>
         </p:nvCxnSpPr>
@@ -6704,7 +6653,7 @@
       </p:cxnSp>
       <p:cxnSp>
         <p:nvCxnSpPr>
-          <p:cNvPr id="80" name="Google Shape;80;p13"/>
+          <p:cNvPr id="79" name="Google Shape;79;p13"/>
           <p:cNvCxnSpPr/>
           <p:nvPr/>
         </p:nvCxnSpPr>
@@ -6730,7 +6679,7 @@
       </p:cxnSp>
       <p:cxnSp>
         <p:nvCxnSpPr>
-          <p:cNvPr id="81" name="Google Shape;81;p13"/>
+          <p:cNvPr id="80" name="Google Shape;80;p13"/>
           <p:cNvCxnSpPr/>
           <p:nvPr/>
         </p:nvCxnSpPr>
@@ -6758,7 +6707,7 @@
       </p:cxnSp>
       <p:cxnSp>
         <p:nvCxnSpPr>
-          <p:cNvPr id="82" name="Google Shape;82;p13"/>
+          <p:cNvPr id="81" name="Google Shape;81;p13"/>
           <p:cNvCxnSpPr/>
           <p:nvPr/>
         </p:nvCxnSpPr>
@@ -6786,16 +6735,14 @@
       </p:cxnSp>
       <p:cxnSp>
         <p:nvCxnSpPr>
-          <p:cNvPr id="83" name="Google Shape;83;p13"/>
-          <p:cNvCxnSpPr>
-            <a:endCxn id="73" idx="2"/>
-          </p:cNvCxnSpPr>
+          <p:cNvPr id="82" name="Google Shape;82;p13"/>
+          <p:cNvCxnSpPr/>
           <p:nvPr/>
         </p:nvCxnSpPr>
         <p:spPr>
           <a:xfrm>
-            <a:off x="1773650" y="2543725"/>
-            <a:ext cx="3600" cy="707700"/>
+            <a:off x="3348225" y="1815050"/>
+            <a:ext cx="440100" cy="0"/>
           </a:xfrm>
           <a:prstGeom prst="straightConnector1">
             <a:avLst/>
@@ -6814,14 +6761,14 @@
       </p:cxnSp>
       <p:cxnSp>
         <p:nvCxnSpPr>
-          <p:cNvPr id="84" name="Google Shape;84;p13"/>
+          <p:cNvPr id="83" name="Google Shape;83;p13"/>
           <p:cNvCxnSpPr/>
           <p:nvPr/>
         </p:nvCxnSpPr>
         <p:spPr>
           <a:xfrm>
-            <a:off x="3348225" y="1815050"/>
-            <a:ext cx="440100" cy="0"/>
+            <a:off x="3355100" y="2406325"/>
+            <a:ext cx="433200" cy="0"/>
           </a:xfrm>
           <a:prstGeom prst="straightConnector1">
             <a:avLst/>
@@ -6840,14 +6787,14 @@
       </p:cxnSp>
       <p:cxnSp>
         <p:nvCxnSpPr>
-          <p:cNvPr id="85" name="Google Shape;85;p13"/>
+          <p:cNvPr id="84" name="Google Shape;84;p13"/>
           <p:cNvCxnSpPr/>
           <p:nvPr/>
         </p:nvCxnSpPr>
         <p:spPr>
           <a:xfrm>
-            <a:off x="3355100" y="2406325"/>
-            <a:ext cx="433200" cy="0"/>
+            <a:off x="3209875" y="3072225"/>
+            <a:ext cx="572700" cy="5400"/>
           </a:xfrm>
           <a:prstGeom prst="straightConnector1">
             <a:avLst/>
@@ -6864,35 +6811,9 @@
           </a:ln>
         </p:spPr>
       </p:cxnSp>
-      <p:cxnSp>
-        <p:nvCxnSpPr>
-          <p:cNvPr id="86" name="Google Shape;86;p13"/>
-          <p:cNvCxnSpPr/>
-          <p:nvPr/>
-        </p:nvCxnSpPr>
-        <p:spPr>
-          <a:xfrm>
-            <a:off x="3209875" y="3072225"/>
-            <a:ext cx="572700" cy="5400"/>
-          </a:xfrm>
-          <a:prstGeom prst="straightConnector1">
-            <a:avLst/>
-          </a:prstGeom>
-          <a:noFill/>
-          <a:ln cap="flat" cmpd="sng" w="9525">
-            <a:solidFill>
-              <a:schemeClr val="dk2"/>
-            </a:solidFill>
-            <a:prstDash val="solid"/>
-            <a:round/>
-            <a:headEnd len="med" w="med" type="none"/>
-            <a:tailEnd len="med" w="med" type="none"/>
-          </a:ln>
-        </p:spPr>
-      </p:cxnSp>
       <p:sp>
         <p:nvSpPr>
-          <p:cNvPr id="87" name="Google Shape;87;p13"/>
+          <p:cNvPr id="85" name="Google Shape;85;p13"/>
           <p:cNvSpPr/>
           <p:nvPr/>
         </p:nvSpPr>
@@ -6934,7 +6855,7 @@
       </p:sp>
       <p:cxnSp>
         <p:nvCxnSpPr>
-          <p:cNvPr id="88" name="Google Shape;88;p13"/>
+          <p:cNvPr id="86" name="Google Shape;86;p13"/>
           <p:cNvCxnSpPr/>
           <p:nvPr/>
         </p:nvCxnSpPr>
@@ -6960,7 +6881,7 @@
       </p:cxnSp>
       <p:cxnSp>
         <p:nvCxnSpPr>
-          <p:cNvPr id="89" name="Google Shape;89;p13"/>
+          <p:cNvPr id="87" name="Google Shape;87;p13"/>
           <p:cNvCxnSpPr/>
           <p:nvPr/>
         </p:nvCxnSpPr>
@@ -6986,7 +6907,7 @@
       </p:cxnSp>
       <p:cxnSp>
         <p:nvCxnSpPr>
-          <p:cNvPr id="90" name="Google Shape;90;p13"/>
+          <p:cNvPr id="88" name="Google Shape;88;p13"/>
           <p:cNvCxnSpPr/>
           <p:nvPr/>
         </p:nvCxnSpPr>
@@ -7014,7 +6935,7 @@
       </p:cxnSp>
       <p:cxnSp>
         <p:nvCxnSpPr>
-          <p:cNvPr id="91" name="Google Shape;91;p13"/>
+          <p:cNvPr id="89" name="Google Shape;89;p13"/>
           <p:cNvCxnSpPr/>
           <p:nvPr/>
         </p:nvCxnSpPr>
@@ -7040,7 +6961,7 @@
       </p:cxnSp>
       <p:cxnSp>
         <p:nvCxnSpPr>
-          <p:cNvPr id="92" name="Google Shape;92;p13"/>
+          <p:cNvPr id="90" name="Google Shape;90;p13"/>
           <p:cNvCxnSpPr/>
           <p:nvPr/>
         </p:nvCxnSpPr>
@@ -7066,7 +6987,7 @@
       </p:cxnSp>
       <p:cxnSp>
         <p:nvCxnSpPr>
-          <p:cNvPr id="93" name="Google Shape;93;p13"/>
+          <p:cNvPr id="91" name="Google Shape;91;p13"/>
           <p:cNvCxnSpPr>
             <a:endCxn id="58" idx="1"/>
           </p:cNvCxnSpPr>
@@ -7094,7 +7015,7 @@
       </p:cxnSp>
       <p:cxnSp>
         <p:nvCxnSpPr>
-          <p:cNvPr id="94" name="Google Shape;94;p13"/>
+          <p:cNvPr id="92" name="Google Shape;92;p13"/>
           <p:cNvCxnSpPr/>
           <p:nvPr/>
         </p:nvCxnSpPr>
@@ -7122,7 +7043,7 @@
       </p:cxnSp>
       <p:sp>
         <p:nvSpPr>
-          <p:cNvPr id="95" name="Google Shape;95;p13"/>
+          <p:cNvPr id="93" name="Google Shape;93;p13"/>
           <p:cNvSpPr/>
           <p:nvPr/>
         </p:nvSpPr>
@@ -7170,20 +7091,355 @@
           </a:p>
         </p:txBody>
       </p:sp>
+      <p:cxnSp>
+        <p:nvCxnSpPr>
+          <p:cNvPr id="94" name="Google Shape;94;p13"/>
+          <p:cNvCxnSpPr/>
+          <p:nvPr/>
+        </p:nvCxnSpPr>
+        <p:spPr>
+          <a:xfrm flipH="1" rot="10800000">
+            <a:off x="6591575" y="3092450"/>
+            <a:ext cx="600" cy="841800"/>
+          </a:xfrm>
+          <a:prstGeom prst="straightConnector1">
+            <a:avLst/>
+          </a:prstGeom>
+          <a:noFill/>
+          <a:ln cap="flat" cmpd="sng" w="9525">
+            <a:solidFill>
+              <a:schemeClr val="dk2"/>
+            </a:solidFill>
+            <a:prstDash val="solid"/>
+            <a:round/>
+            <a:headEnd len="med" w="med" type="none"/>
+            <a:tailEnd len="med" w="med" type="none"/>
+          </a:ln>
+        </p:spPr>
+      </p:cxnSp>
+      <p:cxnSp>
+        <p:nvCxnSpPr>
+          <p:cNvPr id="95" name="Google Shape;95;p13"/>
+          <p:cNvCxnSpPr/>
+          <p:nvPr/>
+        </p:nvCxnSpPr>
+        <p:spPr>
+          <a:xfrm flipH="1" rot="10800000">
+            <a:off x="7864250" y="2117675"/>
+            <a:ext cx="360900" cy="74400"/>
+          </a:xfrm>
+          <a:prstGeom prst="bentConnector3">
+            <a:avLst>
+              <a:gd fmla="val 100409" name="adj1"/>
+            </a:avLst>
+          </a:prstGeom>
+          <a:noFill/>
+          <a:ln cap="flat" cmpd="sng" w="9525">
+            <a:solidFill>
+              <a:schemeClr val="dk2"/>
+            </a:solidFill>
+            <a:prstDash val="solid"/>
+            <a:round/>
+            <a:headEnd len="med" w="med" type="none"/>
+            <a:tailEnd len="med" w="med" type="none"/>
+          </a:ln>
+        </p:spPr>
+      </p:cxnSp>
+      <p:cxnSp>
+        <p:nvCxnSpPr>
+          <p:cNvPr id="96" name="Google Shape;96;p13"/>
+          <p:cNvCxnSpPr/>
+          <p:nvPr/>
+        </p:nvCxnSpPr>
+        <p:spPr>
+          <a:xfrm>
+            <a:off x="3997200" y="3391550"/>
+            <a:ext cx="1728900" cy="600"/>
+          </a:xfrm>
+          <a:prstGeom prst="bentConnector3">
+            <a:avLst>
+              <a:gd fmla="val 50000" name="adj1"/>
+            </a:avLst>
+          </a:prstGeom>
+          <a:noFill/>
+          <a:ln cap="flat" cmpd="sng" w="9525">
+            <a:solidFill>
+              <a:schemeClr val="dk2"/>
+            </a:solidFill>
+            <a:prstDash val="solid"/>
+            <a:round/>
+            <a:headEnd len="med" w="med" type="none"/>
+            <a:tailEnd len="med" w="med" type="none"/>
+          </a:ln>
+        </p:spPr>
+      </p:cxnSp>
+      <p:cxnSp>
+        <p:nvCxnSpPr>
+          <p:cNvPr id="97" name="Google Shape;97;p13"/>
+          <p:cNvCxnSpPr/>
+          <p:nvPr/>
+        </p:nvCxnSpPr>
+        <p:spPr>
+          <a:xfrm>
+            <a:off x="5929725" y="3391550"/>
+            <a:ext cx="1728900" cy="600"/>
+          </a:xfrm>
+          <a:prstGeom prst="bentConnector3">
+            <a:avLst>
+              <a:gd fmla="val 50000" name="adj1"/>
+            </a:avLst>
+          </a:prstGeom>
+          <a:noFill/>
+          <a:ln cap="flat" cmpd="sng" w="9525">
+            <a:solidFill>
+              <a:schemeClr val="dk2"/>
+            </a:solidFill>
+            <a:prstDash val="solid"/>
+            <a:round/>
+            <a:headEnd len="med" w="med" type="none"/>
+            <a:tailEnd len="med" w="med" type="none"/>
+          </a:ln>
+        </p:spPr>
+      </p:cxnSp>
+      <p:cxnSp>
+        <p:nvCxnSpPr>
+          <p:cNvPr id="98" name="Google Shape;98;p13"/>
+          <p:cNvCxnSpPr/>
+          <p:nvPr/>
+        </p:nvCxnSpPr>
+        <p:spPr>
+          <a:xfrm flipH="1" rot="-5400000">
+            <a:off x="711150" y="3236900"/>
+            <a:ext cx="1394400" cy="600"/>
+          </a:xfrm>
+          <a:prstGeom prst="bentConnector3">
+            <a:avLst>
+              <a:gd fmla="val 50000" name="adj1"/>
+            </a:avLst>
+          </a:prstGeom>
+          <a:noFill/>
+          <a:ln cap="flat" cmpd="sng" w="9525">
+            <a:solidFill>
+              <a:schemeClr val="dk2"/>
+            </a:solidFill>
+            <a:prstDash val="solid"/>
+            <a:round/>
+            <a:headEnd len="med" w="med" type="none"/>
+            <a:tailEnd len="med" w="med" type="none"/>
+          </a:ln>
+        </p:spPr>
+      </p:cxnSp>
+      <p:cxnSp>
+        <p:nvCxnSpPr>
+          <p:cNvPr id="99" name="Google Shape;99;p13"/>
+          <p:cNvCxnSpPr/>
+          <p:nvPr/>
+        </p:nvCxnSpPr>
+        <p:spPr>
+          <a:xfrm rot="5400000">
+            <a:off x="1077925" y="3230100"/>
+            <a:ext cx="1389300" cy="600"/>
+          </a:xfrm>
+          <a:prstGeom prst="bentConnector3">
+            <a:avLst>
+              <a:gd fmla="val 50000" name="adj1"/>
+            </a:avLst>
+          </a:prstGeom>
+          <a:noFill/>
+          <a:ln cap="flat" cmpd="sng" w="9525">
+            <a:solidFill>
+              <a:schemeClr val="dk2"/>
+            </a:solidFill>
+            <a:prstDash val="solid"/>
+            <a:round/>
+            <a:headEnd len="med" w="med" type="none"/>
+            <a:tailEnd len="med" w="med" type="none"/>
+          </a:ln>
+        </p:spPr>
+      </p:cxnSp>
+      <p:cxnSp>
+        <p:nvCxnSpPr>
+          <p:cNvPr id="100" name="Google Shape;100;p13"/>
+          <p:cNvCxnSpPr/>
+          <p:nvPr/>
+        </p:nvCxnSpPr>
+        <p:spPr>
+          <a:xfrm rot="5400000">
+            <a:off x="6554025" y="3509200"/>
+            <a:ext cx="835500" cy="900"/>
+          </a:xfrm>
+          <a:prstGeom prst="bentConnector3">
+            <a:avLst>
+              <a:gd fmla="val 4081" name="adj1"/>
+            </a:avLst>
+          </a:prstGeom>
+          <a:noFill/>
+          <a:ln cap="flat" cmpd="sng" w="9525">
+            <a:solidFill>
+              <a:schemeClr val="dk2"/>
+            </a:solidFill>
+            <a:prstDash val="solid"/>
+            <a:round/>
+            <a:headEnd len="med" w="med" type="none"/>
+            <a:tailEnd len="med" w="med" type="none"/>
+          </a:ln>
+        </p:spPr>
+      </p:cxnSp>
+      <p:cxnSp>
+        <p:nvCxnSpPr>
+          <p:cNvPr id="101" name="Google Shape;101;p13"/>
+          <p:cNvCxnSpPr>
+            <a:stCxn id="59" idx="2"/>
+          </p:cNvCxnSpPr>
+          <p:nvPr/>
+        </p:nvCxnSpPr>
+        <p:spPr>
+          <a:xfrm flipH="1" rot="5400000">
+            <a:off x="4707200" y="435125"/>
+            <a:ext cx="1106400" cy="4998900"/>
+          </a:xfrm>
+          <a:prstGeom prst="bentConnector4">
+            <a:avLst>
+              <a:gd fmla="val -21523" name="adj1"/>
+              <a:gd fmla="val 100002" name="adj2"/>
+            </a:avLst>
+          </a:prstGeom>
+          <a:noFill/>
+          <a:ln cap="flat" cmpd="sng" w="9525">
+            <a:solidFill>
+              <a:schemeClr val="dk2"/>
+            </a:solidFill>
+            <a:prstDash val="solid"/>
+            <a:round/>
+            <a:headEnd len="med" w="med" type="none"/>
+            <a:tailEnd len="med" w="med" type="none"/>
+          </a:ln>
+        </p:spPr>
+      </p:cxnSp>
+      <p:cxnSp>
+        <p:nvCxnSpPr>
+          <p:cNvPr id="102" name="Google Shape;102;p13"/>
+          <p:cNvCxnSpPr/>
+          <p:nvPr/>
+        </p:nvCxnSpPr>
+        <p:spPr>
+          <a:xfrm>
+            <a:off x="2761900" y="2383050"/>
+            <a:ext cx="102900" cy="0"/>
+          </a:xfrm>
+          <a:prstGeom prst="straightConnector1">
+            <a:avLst/>
+          </a:prstGeom>
+          <a:noFill/>
+          <a:ln cap="flat" cmpd="sng" w="9525">
+            <a:solidFill>
+              <a:schemeClr val="dk2"/>
+            </a:solidFill>
+            <a:prstDash val="solid"/>
+            <a:round/>
+            <a:headEnd len="med" w="med" type="none"/>
+            <a:tailEnd len="med" w="med" type="none"/>
+          </a:ln>
+        </p:spPr>
+      </p:cxnSp>
+      <p:cxnSp>
+        <p:nvCxnSpPr>
+          <p:cNvPr id="103" name="Google Shape;103;p13"/>
+          <p:cNvCxnSpPr/>
+          <p:nvPr/>
+        </p:nvCxnSpPr>
+        <p:spPr>
+          <a:xfrm rot="5400000">
+            <a:off x="2222850" y="3153100"/>
+            <a:ext cx="1209300" cy="64200"/>
+          </a:xfrm>
+          <a:prstGeom prst="bentConnector3">
+            <a:avLst>
+              <a:gd fmla="val 0" name="adj1"/>
+            </a:avLst>
+          </a:prstGeom>
+          <a:noFill/>
+          <a:ln cap="flat" cmpd="sng" w="9525">
+            <a:solidFill>
+              <a:schemeClr val="dk2"/>
+            </a:solidFill>
+            <a:prstDash val="solid"/>
+            <a:round/>
+            <a:headEnd len="med" w="med" type="none"/>
+            <a:tailEnd len="med" w="med" type="none"/>
+          </a:ln>
+        </p:spPr>
+      </p:cxnSp>
+      <p:cxnSp>
+        <p:nvCxnSpPr>
+          <p:cNvPr id="104" name="Google Shape;104;p13"/>
+          <p:cNvCxnSpPr/>
+          <p:nvPr/>
+        </p:nvCxnSpPr>
+        <p:spPr>
+          <a:xfrm flipH="1" rot="-5400000">
+            <a:off x="7547625" y="2889075"/>
+            <a:ext cx="1663800" cy="131100"/>
+          </a:xfrm>
+          <a:prstGeom prst="bentConnector3">
+            <a:avLst>
+              <a:gd fmla="val -332" name="adj1"/>
+            </a:avLst>
+          </a:prstGeom>
+          <a:noFill/>
+          <a:ln cap="flat" cmpd="sng" w="9525">
+            <a:solidFill>
+              <a:schemeClr val="dk2"/>
+            </a:solidFill>
+            <a:prstDash val="solid"/>
+            <a:round/>
+            <a:headEnd len="med" w="med" type="none"/>
+            <a:tailEnd len="med" w="med" type="none"/>
+          </a:ln>
+        </p:spPr>
+      </p:cxnSp>
+      <p:cxnSp>
+        <p:nvCxnSpPr>
+          <p:cNvPr id="105" name="Google Shape;105;p13"/>
+          <p:cNvCxnSpPr/>
+          <p:nvPr/>
+        </p:nvCxnSpPr>
+        <p:spPr>
+          <a:xfrm>
+            <a:off x="2796550" y="3785625"/>
+            <a:ext cx="5648700" cy="900"/>
+          </a:xfrm>
+          <a:prstGeom prst="bentConnector3">
+            <a:avLst>
+              <a:gd fmla="val 50000" name="adj1"/>
+            </a:avLst>
+          </a:prstGeom>
+          <a:noFill/>
+          <a:ln cap="flat" cmpd="sng" w="9525">
+            <a:solidFill>
+              <a:schemeClr val="dk2"/>
+            </a:solidFill>
+            <a:prstDash val="solid"/>
+            <a:round/>
+            <a:headEnd len="med" w="med" type="none"/>
+            <a:tailEnd len="med" w="med" type="none"/>
+          </a:ln>
+        </p:spPr>
+      </p:cxnSp>
       <p:sp>
         <p:nvSpPr>
-          <p:cNvPr id="96" name="Google Shape;96;p13"/>
+          <p:cNvPr id="106" name="Google Shape;106;p13"/>
           <p:cNvSpPr/>
           <p:nvPr/>
         </p:nvSpPr>
         <p:spPr>
-          <a:xfrm rot="10800000">
-            <a:off x="6786725" y="3588775"/>
-            <a:ext cx="371100" cy="78600"/>
-          </a:xfrm>
-          <a:prstGeom prst="trapezoid">
+          <a:xfrm>
+            <a:off x="723300" y="2511175"/>
+            <a:ext cx="213000" cy="99300"/>
+          </a:xfrm>
+          <a:prstGeom prst="triangle">
             <a:avLst>
-              <a:gd fmla="val 127315" name="adj"/>
+              <a:gd fmla="val 50000" name="adj"/>
             </a:avLst>
           </a:prstGeom>
           <a:solidFill>
@@ -7205,7 +7461,7 @@
           </a:bodyPr>
           <a:lstStyle/>
           <a:p>
-            <a:pPr indent="0" lvl="0" marL="0" rtl="0" algn="l">
+            <a:pPr indent="0" lvl="0" marL="0" rtl="0" algn="ctr">
               <a:spcBef>
                 <a:spcPts val="0"/>
               </a:spcBef>
@@ -7217,382 +7473,19 @@
             <a:r>
               <a:t/>
             </a:r>
-            <a:endParaRPr sz="600"/>
+            <a:endParaRPr/>
           </a:p>
         </p:txBody>
       </p:sp>
-      <p:cxnSp>
-        <p:nvCxnSpPr>
-          <p:cNvPr id="97" name="Google Shape;97;p13"/>
-          <p:cNvCxnSpPr>
-            <a:endCxn id="96" idx="2"/>
-          </p:cNvCxnSpPr>
-          <p:nvPr/>
-        </p:nvCxnSpPr>
-        <p:spPr>
-          <a:xfrm>
-            <a:off x="6968675" y="3092275"/>
-            <a:ext cx="3600" cy="496500"/>
-          </a:xfrm>
-          <a:prstGeom prst="straightConnector1">
-            <a:avLst/>
-          </a:prstGeom>
-          <a:noFill/>
-          <a:ln cap="flat" cmpd="sng" w="9525">
-            <a:solidFill>
-              <a:schemeClr val="dk2"/>
-            </a:solidFill>
-            <a:prstDash val="solid"/>
-            <a:round/>
-            <a:headEnd len="med" w="med" type="none"/>
-            <a:tailEnd len="med" w="med" type="none"/>
-          </a:ln>
-        </p:spPr>
-      </p:cxnSp>
-      <p:cxnSp>
-        <p:nvCxnSpPr>
-          <p:cNvPr id="98" name="Google Shape;98;p13"/>
-          <p:cNvCxnSpPr/>
-          <p:nvPr/>
-        </p:nvCxnSpPr>
-        <p:spPr>
-          <a:xfrm flipH="1" rot="10800000">
-            <a:off x="6591575" y="3092450"/>
-            <a:ext cx="600" cy="841800"/>
-          </a:xfrm>
-          <a:prstGeom prst="straightConnector1">
-            <a:avLst/>
-          </a:prstGeom>
-          <a:noFill/>
-          <a:ln cap="flat" cmpd="sng" w="9525">
-            <a:solidFill>
-              <a:schemeClr val="dk2"/>
-            </a:solidFill>
-            <a:prstDash val="solid"/>
-            <a:round/>
-            <a:headEnd len="med" w="med" type="none"/>
-            <a:tailEnd len="med" w="med" type="none"/>
-          </a:ln>
-        </p:spPr>
-      </p:cxnSp>
-      <p:cxnSp>
-        <p:nvCxnSpPr>
-          <p:cNvPr id="99" name="Google Shape;99;p13"/>
-          <p:cNvCxnSpPr/>
-          <p:nvPr/>
-        </p:nvCxnSpPr>
-        <p:spPr>
-          <a:xfrm flipH="1" rot="10800000">
-            <a:off x="7864250" y="2117675"/>
-            <a:ext cx="360900" cy="74400"/>
-          </a:xfrm>
-          <a:prstGeom prst="bentConnector3">
-            <a:avLst>
-              <a:gd fmla="val 100409" name="adj1"/>
-            </a:avLst>
-          </a:prstGeom>
-          <a:noFill/>
-          <a:ln cap="flat" cmpd="sng" w="9525">
-            <a:solidFill>
-              <a:schemeClr val="dk2"/>
-            </a:solidFill>
-            <a:prstDash val="solid"/>
-            <a:round/>
-            <a:headEnd len="med" w="med" type="none"/>
-            <a:tailEnd len="med" w="med" type="none"/>
-          </a:ln>
-        </p:spPr>
-      </p:cxnSp>
-      <p:cxnSp>
-        <p:nvCxnSpPr>
-          <p:cNvPr id="100" name="Google Shape;100;p13"/>
-          <p:cNvCxnSpPr/>
-          <p:nvPr/>
-        </p:nvCxnSpPr>
-        <p:spPr>
-          <a:xfrm>
-            <a:off x="3997200" y="3391550"/>
-            <a:ext cx="1728900" cy="600"/>
-          </a:xfrm>
-          <a:prstGeom prst="bentConnector3">
-            <a:avLst>
-              <a:gd fmla="val 50000" name="adj1"/>
-            </a:avLst>
-          </a:prstGeom>
-          <a:noFill/>
-          <a:ln cap="flat" cmpd="sng" w="9525">
-            <a:solidFill>
-              <a:schemeClr val="dk2"/>
-            </a:solidFill>
-            <a:prstDash val="solid"/>
-            <a:round/>
-            <a:headEnd len="med" w="med" type="none"/>
-            <a:tailEnd len="med" w="med" type="none"/>
-          </a:ln>
-        </p:spPr>
-      </p:cxnSp>
-      <p:cxnSp>
-        <p:nvCxnSpPr>
-          <p:cNvPr id="101" name="Google Shape;101;p13"/>
-          <p:cNvCxnSpPr/>
-          <p:nvPr/>
-        </p:nvCxnSpPr>
-        <p:spPr>
-          <a:xfrm>
-            <a:off x="5929725" y="3391550"/>
-            <a:ext cx="1728900" cy="600"/>
-          </a:xfrm>
-          <a:prstGeom prst="bentConnector3">
-            <a:avLst>
-              <a:gd fmla="val 50000" name="adj1"/>
-            </a:avLst>
-          </a:prstGeom>
-          <a:noFill/>
-          <a:ln cap="flat" cmpd="sng" w="9525">
-            <a:solidFill>
-              <a:schemeClr val="dk2"/>
-            </a:solidFill>
-            <a:prstDash val="solid"/>
-            <a:round/>
-            <a:headEnd len="med" w="med" type="none"/>
-            <a:tailEnd len="med" w="med" type="none"/>
-          </a:ln>
-        </p:spPr>
-      </p:cxnSp>
-      <p:cxnSp>
-        <p:nvCxnSpPr>
-          <p:cNvPr id="102" name="Google Shape;102;p13"/>
-          <p:cNvCxnSpPr/>
-          <p:nvPr/>
-        </p:nvCxnSpPr>
-        <p:spPr>
-          <a:xfrm flipH="1" rot="-5400000">
-            <a:off x="711150" y="3236900"/>
-            <a:ext cx="1394400" cy="600"/>
-          </a:xfrm>
-          <a:prstGeom prst="bentConnector3">
-            <a:avLst>
-              <a:gd fmla="val 50000" name="adj1"/>
-            </a:avLst>
-          </a:prstGeom>
-          <a:noFill/>
-          <a:ln cap="flat" cmpd="sng" w="9525">
-            <a:solidFill>
-              <a:schemeClr val="dk2"/>
-            </a:solidFill>
-            <a:prstDash val="solid"/>
-            <a:round/>
-            <a:headEnd len="med" w="med" type="none"/>
-            <a:tailEnd len="med" w="med" type="none"/>
-          </a:ln>
-        </p:spPr>
-      </p:cxnSp>
-      <p:cxnSp>
-        <p:nvCxnSpPr>
-          <p:cNvPr id="103" name="Google Shape;103;p13"/>
-          <p:cNvCxnSpPr/>
-          <p:nvPr/>
-        </p:nvCxnSpPr>
-        <p:spPr>
-          <a:xfrm rot="5400000">
-            <a:off x="1478750" y="3624613"/>
-            <a:ext cx="593700" cy="6900"/>
-          </a:xfrm>
-          <a:prstGeom prst="bentConnector3">
-            <a:avLst>
-              <a:gd fmla="val 99983" name="adj1"/>
-            </a:avLst>
-          </a:prstGeom>
-          <a:noFill/>
-          <a:ln cap="flat" cmpd="sng" w="9525">
-            <a:solidFill>
-              <a:schemeClr val="dk2"/>
-            </a:solidFill>
-            <a:prstDash val="solid"/>
-            <a:round/>
-            <a:headEnd len="med" w="med" type="none"/>
-            <a:tailEnd len="med" w="med" type="none"/>
-          </a:ln>
-        </p:spPr>
-      </p:cxnSp>
-      <p:cxnSp>
-        <p:nvCxnSpPr>
-          <p:cNvPr id="104" name="Google Shape;104;p13"/>
-          <p:cNvCxnSpPr/>
-          <p:nvPr/>
-        </p:nvCxnSpPr>
-        <p:spPr>
-          <a:xfrm rot="5400000">
-            <a:off x="6844925" y="3799125"/>
-            <a:ext cx="254700" cy="1800"/>
-          </a:xfrm>
-          <a:prstGeom prst="bentConnector3">
-            <a:avLst>
-              <a:gd fmla="val 50000" name="adj1"/>
-            </a:avLst>
-          </a:prstGeom>
-          <a:noFill/>
-          <a:ln cap="flat" cmpd="sng" w="9525">
-            <a:solidFill>
-              <a:schemeClr val="dk2"/>
-            </a:solidFill>
-            <a:prstDash val="solid"/>
-            <a:round/>
-            <a:headEnd len="med" w="med" type="none"/>
-            <a:tailEnd len="med" w="med" type="none"/>
-          </a:ln>
-        </p:spPr>
-      </p:cxnSp>
-      <p:cxnSp>
-        <p:nvCxnSpPr>
-          <p:cNvPr id="105" name="Google Shape;105;p13"/>
-          <p:cNvCxnSpPr>
-            <a:stCxn id="59" idx="2"/>
-          </p:cNvCxnSpPr>
-          <p:nvPr/>
-        </p:nvCxnSpPr>
-        <p:spPr>
-          <a:xfrm flipH="1" rot="5400000">
-            <a:off x="4707200" y="435125"/>
-            <a:ext cx="1106400" cy="4998900"/>
-          </a:xfrm>
-          <a:prstGeom prst="bentConnector4">
-            <a:avLst>
-              <a:gd fmla="val -21523" name="adj1"/>
-              <a:gd fmla="val 100002" name="adj2"/>
-            </a:avLst>
-          </a:prstGeom>
-          <a:noFill/>
-          <a:ln cap="flat" cmpd="sng" w="9525">
-            <a:solidFill>
-              <a:schemeClr val="dk2"/>
-            </a:solidFill>
-            <a:prstDash val="solid"/>
-            <a:round/>
-            <a:headEnd len="med" w="med" type="none"/>
-            <a:tailEnd len="med" w="med" type="none"/>
-          </a:ln>
-        </p:spPr>
-      </p:cxnSp>
-      <p:cxnSp>
-        <p:nvCxnSpPr>
-          <p:cNvPr id="106" name="Google Shape;106;p13"/>
-          <p:cNvCxnSpPr/>
-          <p:nvPr/>
-        </p:nvCxnSpPr>
-        <p:spPr>
-          <a:xfrm>
-            <a:off x="2761900" y="2383050"/>
-            <a:ext cx="102900" cy="0"/>
-          </a:xfrm>
-          <a:prstGeom prst="straightConnector1">
-            <a:avLst/>
-          </a:prstGeom>
-          <a:noFill/>
-          <a:ln cap="flat" cmpd="sng" w="9525">
-            <a:solidFill>
-              <a:schemeClr val="dk2"/>
-            </a:solidFill>
-            <a:prstDash val="solid"/>
-            <a:round/>
-            <a:headEnd len="med" w="med" type="none"/>
-            <a:tailEnd len="med" w="med" type="none"/>
-          </a:ln>
-        </p:spPr>
-      </p:cxnSp>
-      <p:cxnSp>
-        <p:nvCxnSpPr>
-          <p:cNvPr id="107" name="Google Shape;107;p13"/>
-          <p:cNvCxnSpPr/>
-          <p:nvPr/>
-        </p:nvCxnSpPr>
-        <p:spPr>
-          <a:xfrm rot="5400000">
-            <a:off x="2222850" y="3153100"/>
-            <a:ext cx="1209300" cy="64200"/>
-          </a:xfrm>
-          <a:prstGeom prst="bentConnector3">
-            <a:avLst>
-              <a:gd fmla="val 0" name="adj1"/>
-            </a:avLst>
-          </a:prstGeom>
-          <a:noFill/>
-          <a:ln cap="flat" cmpd="sng" w="9525">
-            <a:solidFill>
-              <a:schemeClr val="dk2"/>
-            </a:solidFill>
-            <a:prstDash val="solid"/>
-            <a:round/>
-            <a:headEnd len="med" w="med" type="none"/>
-            <a:tailEnd len="med" w="med" type="none"/>
-          </a:ln>
-        </p:spPr>
-      </p:cxnSp>
-      <p:cxnSp>
-        <p:nvCxnSpPr>
-          <p:cNvPr id="108" name="Google Shape;108;p13"/>
-          <p:cNvCxnSpPr/>
-          <p:nvPr/>
-        </p:nvCxnSpPr>
-        <p:spPr>
-          <a:xfrm flipH="1" rot="-5400000">
-            <a:off x="7547625" y="2889075"/>
-            <a:ext cx="1663800" cy="131100"/>
-          </a:xfrm>
-          <a:prstGeom prst="bentConnector3">
-            <a:avLst>
-              <a:gd fmla="val -332" name="adj1"/>
-            </a:avLst>
-          </a:prstGeom>
-          <a:noFill/>
-          <a:ln cap="flat" cmpd="sng" w="9525">
-            <a:solidFill>
-              <a:schemeClr val="dk2"/>
-            </a:solidFill>
-            <a:prstDash val="solid"/>
-            <a:round/>
-            <a:headEnd len="med" w="med" type="none"/>
-            <a:tailEnd len="med" w="med" type="none"/>
-          </a:ln>
-        </p:spPr>
-      </p:cxnSp>
-      <p:cxnSp>
-        <p:nvCxnSpPr>
-          <p:cNvPr id="109" name="Google Shape;109;p13"/>
-          <p:cNvCxnSpPr/>
-          <p:nvPr/>
-        </p:nvCxnSpPr>
-        <p:spPr>
-          <a:xfrm>
-            <a:off x="2796550" y="3785625"/>
-            <a:ext cx="5648700" cy="900"/>
-          </a:xfrm>
-          <a:prstGeom prst="bentConnector3">
-            <a:avLst>
-              <a:gd fmla="val 50000" name="adj1"/>
-            </a:avLst>
-          </a:prstGeom>
-          <a:noFill/>
-          <a:ln cap="flat" cmpd="sng" w="9525">
-            <a:solidFill>
-              <a:schemeClr val="dk2"/>
-            </a:solidFill>
-            <a:prstDash val="solid"/>
-            <a:round/>
-            <a:headEnd len="med" w="med" type="none"/>
-            <a:tailEnd len="med" w="med" type="none"/>
-          </a:ln>
-        </p:spPr>
-      </p:cxnSp>
       <p:sp>
         <p:nvSpPr>
-          <p:cNvPr id="110" name="Google Shape;110;p13"/>
+          <p:cNvPr id="107" name="Google Shape;107;p13"/>
           <p:cNvSpPr/>
           <p:nvPr/>
         </p:nvSpPr>
         <p:spPr>
           <a:xfrm>
-            <a:off x="723300" y="2511175"/>
+            <a:off x="2215750" y="3388475"/>
             <a:ext cx="213000" cy="99300"/>
           </a:xfrm>
           <a:prstGeom prst="triangle">
@@ -7637,13 +7530,13 @@
       </p:sp>
       <p:sp>
         <p:nvSpPr>
-          <p:cNvPr id="111" name="Google Shape;111;p13"/>
+          <p:cNvPr id="108" name="Google Shape;108;p13"/>
           <p:cNvSpPr/>
           <p:nvPr/>
         </p:nvSpPr>
         <p:spPr>
           <a:xfrm>
-            <a:off x="2215750" y="3388475"/>
+            <a:off x="3779300" y="3392150"/>
             <a:ext cx="213000" cy="99300"/>
           </a:xfrm>
           <a:prstGeom prst="triangle">
@@ -7688,13 +7581,13 @@
       </p:sp>
       <p:sp>
         <p:nvSpPr>
-          <p:cNvPr id="112" name="Google Shape;112;p13"/>
+          <p:cNvPr id="109" name="Google Shape;109;p13"/>
           <p:cNvSpPr/>
           <p:nvPr/>
         </p:nvSpPr>
         <p:spPr>
           <a:xfrm>
-            <a:off x="3779300" y="3392150"/>
+            <a:off x="5720263" y="3388475"/>
             <a:ext cx="213000" cy="99300"/>
           </a:xfrm>
           <a:prstGeom prst="triangle">
@@ -7739,13 +7632,13 @@
       </p:sp>
       <p:sp>
         <p:nvSpPr>
-          <p:cNvPr id="113" name="Google Shape;113;p13"/>
+          <p:cNvPr id="110" name="Google Shape;110;p13"/>
           <p:cNvSpPr/>
           <p:nvPr/>
         </p:nvSpPr>
         <p:spPr>
           <a:xfrm>
-            <a:off x="5720263" y="3388475"/>
+            <a:off x="7653350" y="3392150"/>
             <a:ext cx="213000" cy="99300"/>
           </a:xfrm>
           <a:prstGeom prst="triangle">
@@ -7788,21 +7681,300 @@
           </a:p>
         </p:txBody>
       </p:sp>
+      <p:cxnSp>
+        <p:nvCxnSpPr>
+          <p:cNvPr id="111" name="Google Shape;111;p13"/>
+          <p:cNvCxnSpPr/>
+          <p:nvPr/>
+        </p:nvCxnSpPr>
+        <p:spPr>
+          <a:xfrm flipH="1" rot="10800000">
+            <a:off x="279625" y="620275"/>
+            <a:ext cx="5334900" cy="1560000"/>
+          </a:xfrm>
+          <a:prstGeom prst="bentConnector3">
+            <a:avLst>
+              <a:gd fmla="val -82" name="adj1"/>
+            </a:avLst>
+          </a:prstGeom>
+          <a:noFill/>
+          <a:ln cap="flat" cmpd="sng" w="9525">
+            <a:solidFill>
+              <a:schemeClr val="dk2"/>
+            </a:solidFill>
+            <a:prstDash val="solid"/>
+            <a:round/>
+            <a:headEnd len="med" w="med" type="none"/>
+            <a:tailEnd len="med" w="med" type="none"/>
+          </a:ln>
+        </p:spPr>
+      </p:cxnSp>
+      <p:cxnSp>
+        <p:nvCxnSpPr>
+          <p:cNvPr id="112" name="Google Shape;112;p13"/>
+          <p:cNvCxnSpPr>
+            <a:endCxn id="58" idx="1"/>
+          </p:cNvCxnSpPr>
+          <p:nvPr/>
+        </p:nvCxnSpPr>
+        <p:spPr>
+          <a:xfrm flipH="1" rot="-5400000">
+            <a:off x="4921675" y="1317575"/>
+            <a:ext cx="1491300" cy="105900"/>
+          </a:xfrm>
+          <a:prstGeom prst="bentConnector2">
+            <a:avLst/>
+          </a:prstGeom>
+          <a:noFill/>
+          <a:ln cap="flat" cmpd="sng" w="9525">
+            <a:solidFill>
+              <a:schemeClr val="dk2"/>
+            </a:solidFill>
+            <a:prstDash val="solid"/>
+            <a:round/>
+            <a:headEnd len="med" w="med" type="none"/>
+            <a:tailEnd len="med" w="med" type="none"/>
+          </a:ln>
+        </p:spPr>
+      </p:cxnSp>
+      <p:cxnSp>
+        <p:nvCxnSpPr>
+          <p:cNvPr id="113" name="Google Shape;113;p13"/>
+          <p:cNvCxnSpPr/>
+          <p:nvPr/>
+        </p:nvCxnSpPr>
+        <p:spPr>
+          <a:xfrm rot="-5400000">
+            <a:off x="4880150" y="1360725"/>
+            <a:ext cx="1330800" cy="50400"/>
+          </a:xfrm>
+          <a:prstGeom prst="bentConnector3">
+            <a:avLst>
+              <a:gd fmla="val 0" name="adj1"/>
+            </a:avLst>
+          </a:prstGeom>
+          <a:noFill/>
+          <a:ln cap="flat" cmpd="sng" w="9525">
+            <a:solidFill>
+              <a:schemeClr val="dk2"/>
+            </a:solidFill>
+            <a:prstDash val="solid"/>
+            <a:round/>
+            <a:headEnd len="med" w="med" type="none"/>
+            <a:tailEnd len="med" w="med" type="none"/>
+          </a:ln>
+        </p:spPr>
+      </p:cxnSp>
+      <p:cxnSp>
+        <p:nvCxnSpPr>
+          <p:cNvPr id="114" name="Google Shape;114;p13"/>
+          <p:cNvCxnSpPr/>
+          <p:nvPr/>
+        </p:nvCxnSpPr>
+        <p:spPr>
+          <a:xfrm flipH="1">
+            <a:off x="427925" y="719975"/>
+            <a:ext cx="5147100" cy="600"/>
+          </a:xfrm>
+          <a:prstGeom prst="bentConnector3">
+            <a:avLst>
+              <a:gd fmla="val 50000" name="adj1"/>
+            </a:avLst>
+          </a:prstGeom>
+          <a:noFill/>
+          <a:ln cap="flat" cmpd="sng" w="9525">
+            <a:solidFill>
+              <a:schemeClr val="dk2"/>
+            </a:solidFill>
+            <a:prstDash val="solid"/>
+            <a:round/>
+            <a:headEnd len="med" w="med" type="none"/>
+            <a:tailEnd len="med" w="med" type="none"/>
+          </a:ln>
+        </p:spPr>
+      </p:cxnSp>
+      <p:cxnSp>
+        <p:nvCxnSpPr>
+          <p:cNvPr id="115" name="Google Shape;115;p13"/>
+          <p:cNvCxnSpPr/>
+          <p:nvPr/>
+        </p:nvCxnSpPr>
+        <p:spPr>
+          <a:xfrm rot="-5400000">
+            <a:off x="-200875" y="1349060"/>
+            <a:ext cx="1258200" cy="600"/>
+          </a:xfrm>
+          <a:prstGeom prst="bentConnector3">
+            <a:avLst>
+              <a:gd fmla="val 50000" name="adj1"/>
+            </a:avLst>
+          </a:prstGeom>
+          <a:noFill/>
+          <a:ln cap="flat" cmpd="sng" w="9525">
+            <a:solidFill>
+              <a:schemeClr val="dk2"/>
+            </a:solidFill>
+            <a:prstDash val="solid"/>
+            <a:round/>
+            <a:headEnd len="med" w="med" type="none"/>
+            <a:tailEnd len="med" w="med" type="none"/>
+          </a:ln>
+        </p:spPr>
+      </p:cxnSp>
+      <p:cxnSp>
+        <p:nvCxnSpPr>
+          <p:cNvPr id="116" name="Google Shape;116;p13"/>
+          <p:cNvCxnSpPr/>
+          <p:nvPr/>
+        </p:nvCxnSpPr>
+        <p:spPr>
+          <a:xfrm flipH="1" rot="10800000">
+            <a:off x="1669050" y="878150"/>
+            <a:ext cx="546300" cy="323400"/>
+          </a:xfrm>
+          <a:prstGeom prst="bentConnector3">
+            <a:avLst>
+              <a:gd fmla="val 50000" name="adj1"/>
+            </a:avLst>
+          </a:prstGeom>
+          <a:noFill/>
+          <a:ln cap="flat" cmpd="sng" w="9525">
+            <a:solidFill>
+              <a:schemeClr val="dk2"/>
+            </a:solidFill>
+            <a:prstDash val="solid"/>
+            <a:round/>
+            <a:headEnd len="med" w="med" type="none"/>
+            <a:tailEnd len="med" w="med" type="none"/>
+          </a:ln>
+        </p:spPr>
+      </p:cxnSp>
+      <p:cxnSp>
+        <p:nvCxnSpPr>
+          <p:cNvPr id="117" name="Google Shape;117;p13"/>
+          <p:cNvCxnSpPr/>
+          <p:nvPr/>
+        </p:nvCxnSpPr>
+        <p:spPr>
+          <a:xfrm rot="10800000">
+            <a:off x="994200" y="798550"/>
+            <a:ext cx="948300" cy="83100"/>
+          </a:xfrm>
+          <a:prstGeom prst="bentConnector3">
+            <a:avLst>
+              <a:gd fmla="val -432" name="adj1"/>
+            </a:avLst>
+          </a:prstGeom>
+          <a:noFill/>
+          <a:ln cap="flat" cmpd="sng" w="9525">
+            <a:solidFill>
+              <a:schemeClr val="dk2"/>
+            </a:solidFill>
+            <a:prstDash val="solid"/>
+            <a:round/>
+            <a:headEnd len="med" w="med" type="none"/>
+            <a:tailEnd len="med" w="med" type="none"/>
+          </a:ln>
+        </p:spPr>
+      </p:cxnSp>
+      <p:cxnSp>
+        <p:nvCxnSpPr>
+          <p:cNvPr id="118" name="Google Shape;118;p13"/>
+          <p:cNvCxnSpPr/>
+          <p:nvPr/>
+        </p:nvCxnSpPr>
+        <p:spPr>
+          <a:xfrm>
+            <a:off x="276075" y="2183850"/>
+            <a:ext cx="111900" cy="0"/>
+          </a:xfrm>
+          <a:prstGeom prst="straightConnector1">
+            <a:avLst/>
+          </a:prstGeom>
+          <a:noFill/>
+          <a:ln cap="flat" cmpd="sng" w="9525">
+            <a:solidFill>
+              <a:schemeClr val="dk2"/>
+            </a:solidFill>
+            <a:prstDash val="solid"/>
+            <a:round/>
+            <a:headEnd len="med" w="med" type="none"/>
+            <a:tailEnd len="med" w="med" type="none"/>
+          </a:ln>
+        </p:spPr>
+      </p:cxnSp>
+      <p:cxnSp>
+        <p:nvCxnSpPr>
+          <p:cNvPr id="119" name="Google Shape;119;p13"/>
+          <p:cNvCxnSpPr/>
+          <p:nvPr/>
+        </p:nvCxnSpPr>
+        <p:spPr>
+          <a:xfrm>
+            <a:off x="2432200" y="886050"/>
+            <a:ext cx="1351200" cy="600"/>
+          </a:xfrm>
+          <a:prstGeom prst="bentConnector3">
+            <a:avLst>
+              <a:gd fmla="val 50000" name="adj1"/>
+            </a:avLst>
+          </a:prstGeom>
+          <a:noFill/>
+          <a:ln cap="flat" cmpd="sng" w="9525">
+            <a:solidFill>
+              <a:schemeClr val="dk2"/>
+            </a:solidFill>
+            <a:prstDash val="solid"/>
+            <a:round/>
+            <a:headEnd len="med" w="med" type="none"/>
+            <a:tailEnd len="med" w="med" type="none"/>
+          </a:ln>
+        </p:spPr>
+      </p:cxnSp>
+      <p:cxnSp>
+        <p:nvCxnSpPr>
+          <p:cNvPr id="120" name="Google Shape;120;p13"/>
+          <p:cNvCxnSpPr>
+            <a:stCxn id="58" idx="3"/>
+            <a:endCxn id="70" idx="1"/>
+          </p:cNvCxnSpPr>
+          <p:nvPr/>
+        </p:nvCxnSpPr>
+        <p:spPr>
+          <a:xfrm>
+            <a:off x="5933275" y="2116175"/>
+            <a:ext cx="544500" cy="554400"/>
+          </a:xfrm>
+          <a:prstGeom prst="bentConnector3">
+            <a:avLst>
+              <a:gd fmla="val 50011" name="adj1"/>
+            </a:avLst>
+          </a:prstGeom>
+          <a:noFill/>
+          <a:ln cap="flat" cmpd="sng" w="9525">
+            <a:solidFill>
+              <a:schemeClr val="dk2"/>
+            </a:solidFill>
+            <a:prstDash val="solid"/>
+            <a:round/>
+            <a:headEnd len="med" w="med" type="none"/>
+            <a:tailEnd len="med" w="med" type="none"/>
+          </a:ln>
+        </p:spPr>
+      </p:cxnSp>
       <p:sp>
         <p:nvSpPr>
-          <p:cNvPr id="114" name="Google Shape;114;p13"/>
+          <p:cNvPr id="121" name="Google Shape;121;p13"/>
           <p:cNvSpPr/>
           <p:nvPr/>
         </p:nvSpPr>
         <p:spPr>
           <a:xfrm>
-            <a:off x="7653350" y="3392150"/>
-            <a:ext cx="213000" cy="99300"/>
-          </a:xfrm>
-          <a:prstGeom prst="triangle">
-            <a:avLst>
-              <a:gd fmla="val 50000" name="adj"/>
-            </a:avLst>
+            <a:off x="6482525" y="1580343"/>
+            <a:ext cx="621600" cy="369000"/>
+          </a:xfrm>
+          <a:prstGeom prst="rect">
+            <a:avLst/>
           </a:prstGeom>
           <a:solidFill>
             <a:schemeClr val="lt2"/>
@@ -7833,27 +8005,28 @@
               <a:buNone/>
             </a:pPr>
             <a:r>
-              <a:t/>
+              <a:rPr lang="de" sz="600"/>
+              <a:t>STORE BUFFER</a:t>
             </a:r>
-            <a:endParaRPr/>
+            <a:endParaRPr sz="600"/>
           </a:p>
         </p:txBody>
       </p:sp>
       <p:cxnSp>
         <p:nvCxnSpPr>
-          <p:cNvPr id="115" name="Google Shape;115;p13"/>
-          <p:cNvCxnSpPr/>
+          <p:cNvPr id="122" name="Google Shape;122;p13"/>
+          <p:cNvCxnSpPr>
+            <a:endCxn id="121" idx="1"/>
+          </p:cNvCxnSpPr>
           <p:nvPr/>
         </p:nvCxnSpPr>
         <p:spPr>
-          <a:xfrm flipH="1" rot="10800000">
-            <a:off x="279625" y="620275"/>
-            <a:ext cx="5334900" cy="1560000"/>
-          </a:xfrm>
-          <a:prstGeom prst="bentConnector3">
-            <a:avLst>
-              <a:gd fmla="val -82" name="adj1"/>
-            </a:avLst>
+          <a:xfrm rot="-5400000">
+            <a:off x="6168725" y="1802943"/>
+            <a:ext cx="351900" cy="275700"/>
+          </a:xfrm>
+          <a:prstGeom prst="bentConnector2">
+            <a:avLst/>
           </a:prstGeom>
           <a:noFill/>
           <a:ln cap="flat" cmpd="sng" w="9525">
@@ -7867,300 +8040,21 @@
           </a:ln>
         </p:spPr>
       </p:cxnSp>
-      <p:cxnSp>
-        <p:nvCxnSpPr>
-          <p:cNvPr id="116" name="Google Shape;116;p13"/>
-          <p:cNvCxnSpPr>
-            <a:endCxn id="58" idx="1"/>
-          </p:cNvCxnSpPr>
-          <p:nvPr/>
-        </p:nvCxnSpPr>
-        <p:spPr>
-          <a:xfrm flipH="1" rot="-5400000">
-            <a:off x="4921675" y="1317575"/>
-            <a:ext cx="1491300" cy="105900"/>
-          </a:xfrm>
-          <a:prstGeom prst="bentConnector2">
-            <a:avLst/>
-          </a:prstGeom>
-          <a:noFill/>
-          <a:ln cap="flat" cmpd="sng" w="9525">
-            <a:solidFill>
-              <a:schemeClr val="dk2"/>
-            </a:solidFill>
-            <a:prstDash val="solid"/>
-            <a:round/>
-            <a:headEnd len="med" w="med" type="none"/>
-            <a:tailEnd len="med" w="med" type="none"/>
-          </a:ln>
-        </p:spPr>
-      </p:cxnSp>
-      <p:cxnSp>
-        <p:nvCxnSpPr>
-          <p:cNvPr id="117" name="Google Shape;117;p13"/>
-          <p:cNvCxnSpPr/>
-          <p:nvPr/>
-        </p:nvCxnSpPr>
-        <p:spPr>
-          <a:xfrm rot="-5400000">
-            <a:off x="4880150" y="1360725"/>
-            <a:ext cx="1330800" cy="50400"/>
-          </a:xfrm>
-          <a:prstGeom prst="bentConnector3">
-            <a:avLst>
-              <a:gd fmla="val 0" name="adj1"/>
-            </a:avLst>
-          </a:prstGeom>
-          <a:noFill/>
-          <a:ln cap="flat" cmpd="sng" w="9525">
-            <a:solidFill>
-              <a:schemeClr val="dk2"/>
-            </a:solidFill>
-            <a:prstDash val="solid"/>
-            <a:round/>
-            <a:headEnd len="med" w="med" type="none"/>
-            <a:tailEnd len="med" w="med" type="none"/>
-          </a:ln>
-        </p:spPr>
-      </p:cxnSp>
-      <p:cxnSp>
-        <p:nvCxnSpPr>
-          <p:cNvPr id="118" name="Google Shape;118;p13"/>
-          <p:cNvCxnSpPr/>
-          <p:nvPr/>
-        </p:nvCxnSpPr>
-        <p:spPr>
-          <a:xfrm flipH="1">
-            <a:off x="427925" y="719975"/>
-            <a:ext cx="5147100" cy="600"/>
-          </a:xfrm>
-          <a:prstGeom prst="bentConnector3">
-            <a:avLst>
-              <a:gd fmla="val 50000" name="adj1"/>
-            </a:avLst>
-          </a:prstGeom>
-          <a:noFill/>
-          <a:ln cap="flat" cmpd="sng" w="9525">
-            <a:solidFill>
-              <a:schemeClr val="dk2"/>
-            </a:solidFill>
-            <a:prstDash val="solid"/>
-            <a:round/>
-            <a:headEnd len="med" w="med" type="none"/>
-            <a:tailEnd len="med" w="med" type="none"/>
-          </a:ln>
-        </p:spPr>
-      </p:cxnSp>
-      <p:cxnSp>
-        <p:nvCxnSpPr>
-          <p:cNvPr id="119" name="Google Shape;119;p13"/>
-          <p:cNvCxnSpPr/>
-          <p:nvPr/>
-        </p:nvCxnSpPr>
-        <p:spPr>
-          <a:xfrm rot="-5400000">
-            <a:off x="-200875" y="1349060"/>
-            <a:ext cx="1258200" cy="600"/>
-          </a:xfrm>
-          <a:prstGeom prst="bentConnector3">
-            <a:avLst>
-              <a:gd fmla="val 50000" name="adj1"/>
-            </a:avLst>
-          </a:prstGeom>
-          <a:noFill/>
-          <a:ln cap="flat" cmpd="sng" w="9525">
-            <a:solidFill>
-              <a:schemeClr val="dk2"/>
-            </a:solidFill>
-            <a:prstDash val="solid"/>
-            <a:round/>
-            <a:headEnd len="med" w="med" type="none"/>
-            <a:tailEnd len="med" w="med" type="none"/>
-          </a:ln>
-        </p:spPr>
-      </p:cxnSp>
-      <p:cxnSp>
-        <p:nvCxnSpPr>
-          <p:cNvPr id="120" name="Google Shape;120;p13"/>
-          <p:cNvCxnSpPr/>
-          <p:nvPr/>
-        </p:nvCxnSpPr>
-        <p:spPr>
-          <a:xfrm flipH="1" rot="10800000">
-            <a:off x="1669050" y="878150"/>
-            <a:ext cx="546300" cy="323400"/>
-          </a:xfrm>
-          <a:prstGeom prst="bentConnector3">
-            <a:avLst>
-              <a:gd fmla="val 50000" name="adj1"/>
-            </a:avLst>
-          </a:prstGeom>
-          <a:noFill/>
-          <a:ln cap="flat" cmpd="sng" w="9525">
-            <a:solidFill>
-              <a:schemeClr val="dk2"/>
-            </a:solidFill>
-            <a:prstDash val="solid"/>
-            <a:round/>
-            <a:headEnd len="med" w="med" type="none"/>
-            <a:tailEnd len="med" w="med" type="none"/>
-          </a:ln>
-        </p:spPr>
-      </p:cxnSp>
-      <p:cxnSp>
-        <p:nvCxnSpPr>
-          <p:cNvPr id="121" name="Google Shape;121;p13"/>
-          <p:cNvCxnSpPr/>
-          <p:nvPr/>
-        </p:nvCxnSpPr>
-        <p:spPr>
-          <a:xfrm rot="10800000">
-            <a:off x="340800" y="803950"/>
-            <a:ext cx="1601700" cy="77700"/>
-          </a:xfrm>
-          <a:prstGeom prst="bentConnector3">
-            <a:avLst>
-              <a:gd fmla="val -5" name="adj1"/>
-            </a:avLst>
-          </a:prstGeom>
-          <a:noFill/>
-          <a:ln cap="flat" cmpd="sng" w="9525">
-            <a:solidFill>
-              <a:schemeClr val="dk2"/>
-            </a:solidFill>
-            <a:prstDash val="solid"/>
-            <a:round/>
-            <a:headEnd len="med" w="med" type="none"/>
-            <a:tailEnd len="med" w="med" type="none"/>
-          </a:ln>
-        </p:spPr>
-      </p:cxnSp>
-      <p:cxnSp>
-        <p:nvCxnSpPr>
-          <p:cNvPr id="122" name="Google Shape;122;p13"/>
-          <p:cNvCxnSpPr>
-            <a:endCxn id="55" idx="2"/>
-          </p:cNvCxnSpPr>
-          <p:nvPr/>
-        </p:nvCxnSpPr>
-        <p:spPr>
-          <a:xfrm flipH="1" rot="-5400000">
-            <a:off x="-289075" y="1438175"/>
-            <a:ext cx="1312200" cy="43800"/>
-          </a:xfrm>
-          <a:prstGeom prst="bentConnector2">
-            <a:avLst/>
-          </a:prstGeom>
-          <a:noFill/>
-          <a:ln cap="flat" cmpd="sng" w="9525">
-            <a:solidFill>
-              <a:schemeClr val="dk2"/>
-            </a:solidFill>
-            <a:prstDash val="solid"/>
-            <a:round/>
-            <a:headEnd len="med" w="med" type="none"/>
-            <a:tailEnd len="med" w="med" type="none"/>
-          </a:ln>
-        </p:spPr>
-      </p:cxnSp>
-      <p:cxnSp>
-        <p:nvCxnSpPr>
-          <p:cNvPr id="123" name="Google Shape;123;p13"/>
-          <p:cNvCxnSpPr/>
-          <p:nvPr/>
-        </p:nvCxnSpPr>
-        <p:spPr>
-          <a:xfrm>
-            <a:off x="276075" y="2183850"/>
-            <a:ext cx="111900" cy="0"/>
-          </a:xfrm>
-          <a:prstGeom prst="straightConnector1">
-            <a:avLst/>
-          </a:prstGeom>
-          <a:noFill/>
-          <a:ln cap="flat" cmpd="sng" w="9525">
-            <a:solidFill>
-              <a:schemeClr val="dk2"/>
-            </a:solidFill>
-            <a:prstDash val="solid"/>
-            <a:round/>
-            <a:headEnd len="med" w="med" type="none"/>
-            <a:tailEnd len="med" w="med" type="none"/>
-          </a:ln>
-        </p:spPr>
-      </p:cxnSp>
-      <p:cxnSp>
-        <p:nvCxnSpPr>
-          <p:cNvPr id="124" name="Google Shape;124;p13"/>
-          <p:cNvCxnSpPr/>
-          <p:nvPr/>
-        </p:nvCxnSpPr>
-        <p:spPr>
-          <a:xfrm>
-            <a:off x="2432200" y="886050"/>
-            <a:ext cx="1351200" cy="600"/>
-          </a:xfrm>
-          <a:prstGeom prst="bentConnector3">
-            <a:avLst>
-              <a:gd fmla="val 50000" name="adj1"/>
-            </a:avLst>
-          </a:prstGeom>
-          <a:noFill/>
-          <a:ln cap="flat" cmpd="sng" w="9525">
-            <a:solidFill>
-              <a:schemeClr val="dk2"/>
-            </a:solidFill>
-            <a:prstDash val="solid"/>
-            <a:round/>
-            <a:headEnd len="med" w="med" type="none"/>
-            <a:tailEnd len="med" w="med" type="none"/>
-          </a:ln>
-        </p:spPr>
-      </p:cxnSp>
-      <p:cxnSp>
-        <p:nvCxnSpPr>
-          <p:cNvPr id="125" name="Google Shape;125;p13"/>
-          <p:cNvCxnSpPr>
-            <a:stCxn id="58" idx="3"/>
-            <a:endCxn id="70" idx="1"/>
-          </p:cNvCxnSpPr>
-          <p:nvPr/>
-        </p:nvCxnSpPr>
-        <p:spPr>
-          <a:xfrm>
-            <a:off x="5933275" y="2116175"/>
-            <a:ext cx="544500" cy="554400"/>
-          </a:xfrm>
-          <a:prstGeom prst="bentConnector3">
-            <a:avLst>
-              <a:gd fmla="val 50011" name="adj1"/>
-            </a:avLst>
-          </a:prstGeom>
-          <a:noFill/>
-          <a:ln cap="flat" cmpd="sng" w="9525">
-            <a:solidFill>
-              <a:schemeClr val="dk2"/>
-            </a:solidFill>
-            <a:prstDash val="solid"/>
-            <a:round/>
-            <a:headEnd len="med" w="med" type="none"/>
-            <a:tailEnd len="med" w="med" type="none"/>
-          </a:ln>
-        </p:spPr>
-      </p:cxnSp>
       <p:sp>
         <p:nvSpPr>
-          <p:cNvPr id="126" name="Google Shape;126;p13"/>
+          <p:cNvPr id="123" name="Google Shape;123;p13"/>
           <p:cNvSpPr/>
           <p:nvPr/>
         </p:nvSpPr>
         <p:spPr>
-          <a:xfrm>
-            <a:off x="6482525" y="1580343"/>
-            <a:ext cx="621600" cy="369000"/>
-          </a:xfrm>
-          <a:prstGeom prst="rect">
-            <a:avLst/>
+          <a:xfrm rot="5400000">
+            <a:off x="7282875" y="2074175"/>
+            <a:ext cx="371100" cy="78600"/>
+          </a:xfrm>
+          <a:prstGeom prst="trapezoid">
+            <a:avLst>
+              <a:gd fmla="val 127315" name="adj"/>
+            </a:avLst>
           </a:prstGeom>
           <a:solidFill>
             <a:schemeClr val="lt2"/>
@@ -8191,28 +8085,27 @@
               <a:buNone/>
             </a:pPr>
             <a:r>
-              <a:rPr lang="de" sz="600"/>
-              <a:t>STORE BUFFER</a:t>
+              <a:t/>
             </a:r>
-            <a:endParaRPr sz="600"/>
+            <a:endParaRPr/>
           </a:p>
         </p:txBody>
       </p:sp>
       <p:cxnSp>
         <p:nvCxnSpPr>
-          <p:cNvPr id="127" name="Google Shape;127;p13"/>
-          <p:cNvCxnSpPr>
-            <a:endCxn id="126" idx="1"/>
-          </p:cNvCxnSpPr>
+          <p:cNvPr id="124" name="Google Shape;124;p13"/>
+          <p:cNvCxnSpPr/>
           <p:nvPr/>
         </p:nvCxnSpPr>
         <p:spPr>
-          <a:xfrm rot="-5400000">
-            <a:off x="6168725" y="1802943"/>
-            <a:ext cx="351900" cy="275700"/>
-          </a:xfrm>
-          <a:prstGeom prst="bentConnector2">
-            <a:avLst/>
+          <a:xfrm>
+            <a:off x="7106475" y="1758675"/>
+            <a:ext cx="325800" cy="265200"/>
+          </a:xfrm>
+          <a:prstGeom prst="bentConnector3">
+            <a:avLst>
+              <a:gd fmla="val 50000" name="adj1"/>
+            </a:avLst>
           </a:prstGeom>
           <a:noFill/>
           <a:ln cap="flat" cmpd="sng" w="9525">
@@ -8226,72 +8119,21 @@
           </a:ln>
         </p:spPr>
       </p:cxnSp>
-      <p:sp>
-        <p:nvSpPr>
-          <p:cNvPr id="128" name="Google Shape;128;p13"/>
-          <p:cNvSpPr/>
-          <p:nvPr/>
-        </p:nvSpPr>
-        <p:spPr>
-          <a:xfrm rot="5400000">
-            <a:off x="7282875" y="2074175"/>
-            <a:ext cx="371100" cy="78600"/>
-          </a:xfrm>
-          <a:prstGeom prst="trapezoid">
-            <a:avLst>
-              <a:gd fmla="val 127315" name="adj"/>
-            </a:avLst>
-          </a:prstGeom>
-          <a:solidFill>
-            <a:schemeClr val="lt2"/>
-          </a:solidFill>
-          <a:ln cap="flat" cmpd="sng" w="9525">
-            <a:solidFill>
-              <a:schemeClr val="dk2"/>
-            </a:solidFill>
-            <a:prstDash val="solid"/>
-            <a:round/>
-            <a:headEnd len="sm" w="sm" type="none"/>
-            <a:tailEnd len="sm" w="sm" type="none"/>
-          </a:ln>
-        </p:spPr>
-        <p:txBody>
-          <a:bodyPr anchorCtr="0" anchor="ctr" bIns="91425" lIns="91425" spcFirstLastPara="1" rIns="91425" wrap="square" tIns="91425">
-            <a:noAutofit/>
-          </a:bodyPr>
-          <a:lstStyle/>
-          <a:p>
-            <a:pPr indent="0" lvl="0" marL="0" rtl="0" algn="ctr">
-              <a:spcBef>
-                <a:spcPts val="0"/>
-              </a:spcBef>
-              <a:spcAft>
-                <a:spcPts val="0"/>
-              </a:spcAft>
-              <a:buNone/>
-            </a:pPr>
-            <a:r>
-              <a:t/>
-            </a:r>
-            <a:endParaRPr/>
-          </a:p>
-        </p:txBody>
-      </p:sp>
       <p:cxnSp>
         <p:nvCxnSpPr>
-          <p:cNvPr id="129" name="Google Shape;129;p13"/>
-          <p:cNvCxnSpPr/>
+          <p:cNvPr id="125" name="Google Shape;125;p13"/>
+          <p:cNvCxnSpPr>
+            <a:endCxn id="70" idx="3"/>
+          </p:cNvCxnSpPr>
           <p:nvPr/>
         </p:nvCxnSpPr>
         <p:spPr>
-          <a:xfrm>
-            <a:off x="7106475" y="1758675"/>
-            <a:ext cx="325800" cy="265200"/>
-          </a:xfrm>
-          <a:prstGeom prst="bentConnector3">
-            <a:avLst>
-              <a:gd fmla="val 50000" name="adj1"/>
-            </a:avLst>
+          <a:xfrm rot="5400000">
+            <a:off x="6934500" y="2345238"/>
+            <a:ext cx="490200" cy="160200"/>
+          </a:xfrm>
+          <a:prstGeom prst="bentConnector2">
+            <a:avLst/>
           </a:prstGeom>
           <a:noFill/>
           <a:ln cap="flat" cmpd="sng" w="9525">
@@ -8307,19 +8149,19 @@
       </p:cxnSp>
       <p:cxnSp>
         <p:nvCxnSpPr>
-          <p:cNvPr id="130" name="Google Shape;130;p13"/>
-          <p:cNvCxnSpPr>
-            <a:endCxn id="70" idx="3"/>
-          </p:cNvCxnSpPr>
+          <p:cNvPr id="126" name="Google Shape;126;p13"/>
+          <p:cNvCxnSpPr/>
           <p:nvPr/>
         </p:nvCxnSpPr>
         <p:spPr>
-          <a:xfrm rot="5400000">
-            <a:off x="6934500" y="2345238"/>
-            <a:ext cx="490200" cy="160200"/>
-          </a:xfrm>
-          <a:prstGeom prst="bentConnector2">
-            <a:avLst/>
+          <a:xfrm>
+            <a:off x="7264225" y="2183550"/>
+            <a:ext cx="168000" cy="5700"/>
+          </a:xfrm>
+          <a:prstGeom prst="bentConnector3">
+            <a:avLst>
+              <a:gd fmla="val 100015" name="adj1"/>
+            </a:avLst>
           </a:prstGeom>
           <a:noFill/>
           <a:ln cap="flat" cmpd="sng" w="9525">
@@ -8335,18 +8177,20 @@
       </p:cxnSp>
       <p:cxnSp>
         <p:nvCxnSpPr>
-          <p:cNvPr id="131" name="Google Shape;131;p13"/>
-          <p:cNvCxnSpPr/>
+          <p:cNvPr id="127" name="Google Shape;127;p13"/>
+          <p:cNvCxnSpPr>
+            <a:endCxn id="59" idx="1"/>
+          </p:cNvCxnSpPr>
           <p:nvPr/>
         </p:nvCxnSpPr>
         <p:spPr>
           <a:xfrm>
-            <a:off x="7264225" y="2183550"/>
-            <a:ext cx="168000" cy="5700"/>
+            <a:off x="7509650" y="2111975"/>
+            <a:ext cx="143700" cy="4200"/>
           </a:xfrm>
           <a:prstGeom prst="bentConnector3">
             <a:avLst>
-              <a:gd fmla="val 100015" name="adj1"/>
+              <a:gd fmla="val 95999" name="adj1"/>
             </a:avLst>
           </a:prstGeom>
           <a:noFill/>
@@ -8361,39 +8205,9 @@
           </a:ln>
         </p:spPr>
       </p:cxnSp>
-      <p:cxnSp>
-        <p:nvCxnSpPr>
-          <p:cNvPr id="132" name="Google Shape;132;p13"/>
-          <p:cNvCxnSpPr>
-            <a:endCxn id="59" idx="1"/>
-          </p:cNvCxnSpPr>
-          <p:nvPr/>
-        </p:nvCxnSpPr>
-        <p:spPr>
-          <a:xfrm>
-            <a:off x="7509650" y="2111975"/>
-            <a:ext cx="143700" cy="4200"/>
-          </a:xfrm>
-          <a:prstGeom prst="bentConnector3">
-            <a:avLst>
-              <a:gd fmla="val 95999" name="adj1"/>
-            </a:avLst>
-          </a:prstGeom>
-          <a:noFill/>
-          <a:ln cap="flat" cmpd="sng" w="9525">
-            <a:solidFill>
-              <a:schemeClr val="dk2"/>
-            </a:solidFill>
-            <a:prstDash val="solid"/>
-            <a:round/>
-            <a:headEnd len="med" w="med" type="none"/>
-            <a:tailEnd len="med" w="med" type="none"/>
-          </a:ln>
-        </p:spPr>
-      </p:cxnSp>
       <p:sp>
         <p:nvSpPr>
-          <p:cNvPr id="133" name="Google Shape;133;p13"/>
+          <p:cNvPr id="128" name="Google Shape;128;p13"/>
           <p:cNvSpPr txBox="1"/>
           <p:nvPr/>
         </p:nvSpPr>
@@ -8435,7 +8249,7 @@
       </p:sp>
       <p:cxnSp>
         <p:nvCxnSpPr>
-          <p:cNvPr id="134" name="Google Shape;134;p13"/>
+          <p:cNvPr id="129" name="Google Shape;129;p13"/>
           <p:cNvCxnSpPr/>
           <p:nvPr/>
         </p:nvCxnSpPr>
@@ -8463,7 +8277,7 @@
       </p:cxnSp>
       <p:cxnSp>
         <p:nvCxnSpPr>
-          <p:cNvPr id="135" name="Google Shape;135;p13"/>
+          <p:cNvPr id="130" name="Google Shape;130;p13"/>
           <p:cNvCxnSpPr/>
           <p:nvPr/>
         </p:nvCxnSpPr>
@@ -8491,7 +8305,7 @@
       </p:cxnSp>
       <p:cxnSp>
         <p:nvCxnSpPr>
-          <p:cNvPr id="136" name="Google Shape;136;p13"/>
+          <p:cNvPr id="131" name="Google Shape;131;p13"/>
           <p:cNvCxnSpPr/>
           <p:nvPr/>
         </p:nvCxnSpPr>
@@ -8519,7 +8333,7 @@
       </p:cxnSp>
       <p:cxnSp>
         <p:nvCxnSpPr>
-          <p:cNvPr id="137" name="Google Shape;137;p13"/>
+          <p:cNvPr id="132" name="Google Shape;132;p13"/>
           <p:cNvCxnSpPr/>
           <p:nvPr/>
         </p:nvCxnSpPr>
@@ -8547,57 +8361,7 @@
       </p:cxnSp>
       <p:sp>
         <p:nvSpPr>
-          <p:cNvPr id="138" name="Google Shape;138;p13"/>
-          <p:cNvSpPr txBox="1"/>
-          <p:nvPr/>
-        </p:nvSpPr>
-        <p:spPr>
-          <a:xfrm>
-            <a:off x="6786725" y="3487512"/>
-            <a:ext cx="2188200" cy="276900"/>
-          </a:xfrm>
-          <a:prstGeom prst="rect">
-            <a:avLst/>
-          </a:prstGeom>
-          <a:noFill/>
-          <a:ln>
-            <a:noFill/>
-          </a:ln>
-        </p:spPr>
-        <p:txBody>
-          <a:bodyPr anchorCtr="0" anchor="t" bIns="91425" lIns="91425" spcFirstLastPara="1" rIns="91425" wrap="square" tIns="91425">
-            <a:spAutoFit/>
-          </a:bodyPr>
-          <a:lstStyle/>
-          <a:p>
-            <a:pPr indent="0" lvl="0" marL="0" rtl="0" algn="l">
-              <a:spcBef>
-                <a:spcPts val="0"/>
-              </a:spcBef>
-              <a:spcAft>
-                <a:spcPts val="0"/>
-              </a:spcAft>
-              <a:buNone/>
-            </a:pPr>
-            <a:r>
-              <a:rPr lang="de" sz="600">
-                <a:solidFill>
-                  <a:schemeClr val="dk2"/>
-                </a:solidFill>
-              </a:rPr>
-              <a:t>ARB</a:t>
-            </a:r>
-            <a:endParaRPr sz="600">
-              <a:solidFill>
-                <a:schemeClr val="dk2"/>
-              </a:solidFill>
-            </a:endParaRPr>
-          </a:p>
-        </p:txBody>
-      </p:sp>
-      <p:sp>
-        <p:nvSpPr>
-          <p:cNvPr id="139" name="Google Shape;139;p13"/>
+          <p:cNvPr id="133" name="Google Shape;133;p13"/>
           <p:cNvSpPr txBox="1"/>
           <p:nvPr/>
         </p:nvSpPr>
@@ -8652,7 +8416,7 @@
       </p:sp>
       <p:sp>
         <p:nvSpPr>
-          <p:cNvPr id="140" name="Google Shape;140;p13"/>
+          <p:cNvPr id="134" name="Google Shape;134;p13"/>
           <p:cNvSpPr txBox="1"/>
           <p:nvPr/>
         </p:nvSpPr>
@@ -8726,7 +8490,7 @@
       </p:sp>
       <p:sp>
         <p:nvSpPr>
-          <p:cNvPr id="141" name="Google Shape;141;p13"/>
+          <p:cNvPr id="135" name="Google Shape;135;p13"/>
           <p:cNvSpPr txBox="1"/>
           <p:nvPr/>
         </p:nvSpPr>
@@ -8800,7 +8564,7 @@
       </p:sp>
       <p:sp>
         <p:nvSpPr>
-          <p:cNvPr id="142" name="Google Shape;142;p13"/>
+          <p:cNvPr id="136" name="Google Shape;136;p13"/>
           <p:cNvSpPr/>
           <p:nvPr/>
         </p:nvSpPr>
@@ -8852,7 +8616,7 @@
       </p:sp>
       <p:sp>
         <p:nvSpPr>
-          <p:cNvPr id="143" name="Google Shape;143;p13"/>
+          <p:cNvPr id="137" name="Google Shape;137;p13"/>
           <p:cNvSpPr txBox="1"/>
           <p:nvPr/>
         </p:nvSpPr>
@@ -8902,7 +8666,7 @@
       </p:sp>
       <p:sp>
         <p:nvSpPr>
-          <p:cNvPr id="144" name="Google Shape;144;p13"/>
+          <p:cNvPr id="138" name="Google Shape;138;p13"/>
           <p:cNvSpPr txBox="1"/>
           <p:nvPr/>
         </p:nvSpPr>
@@ -8947,7 +8711,7 @@
       </p:sp>
       <p:sp>
         <p:nvSpPr>
-          <p:cNvPr id="145" name="Google Shape;145;p13"/>
+          <p:cNvPr id="139" name="Google Shape;139;p13"/>
           <p:cNvSpPr txBox="1"/>
           <p:nvPr/>
         </p:nvSpPr>
@@ -8997,7 +8761,7 @@
       </p:sp>
       <p:sp>
         <p:nvSpPr>
-          <p:cNvPr id="146" name="Google Shape;146;p13"/>
+          <p:cNvPr id="140" name="Google Shape;140;p13"/>
           <p:cNvSpPr txBox="1"/>
           <p:nvPr/>
         </p:nvSpPr>
@@ -9047,7 +8811,7 @@
       </p:sp>
       <p:sp>
         <p:nvSpPr>
-          <p:cNvPr id="147" name="Google Shape;147;p13"/>
+          <p:cNvPr id="141" name="Google Shape;141;p13"/>
           <p:cNvSpPr txBox="1"/>
           <p:nvPr/>
         </p:nvSpPr>
@@ -9097,7 +8861,7 @@
       </p:sp>
       <p:sp>
         <p:nvSpPr>
-          <p:cNvPr id="148" name="Google Shape;148;p13"/>
+          <p:cNvPr id="142" name="Google Shape;142;p13"/>
           <p:cNvSpPr txBox="1"/>
           <p:nvPr/>
         </p:nvSpPr>
@@ -9147,7 +8911,7 @@
       </p:sp>
       <p:sp>
         <p:nvSpPr>
-          <p:cNvPr id="149" name="Google Shape;149;p13"/>
+          <p:cNvPr id="143" name="Google Shape;143;p13"/>
           <p:cNvSpPr txBox="1"/>
           <p:nvPr/>
         </p:nvSpPr>
@@ -9197,7 +8961,7 @@
       </p:sp>
       <p:sp>
         <p:nvSpPr>
-          <p:cNvPr id="150" name="Google Shape;150;p13"/>
+          <p:cNvPr id="144" name="Google Shape;144;p13"/>
           <p:cNvSpPr txBox="1"/>
           <p:nvPr/>
         </p:nvSpPr>
@@ -9245,59 +9009,9 @@
           </a:p>
         </p:txBody>
       </p:sp>
-      <p:sp>
-        <p:nvSpPr>
-          <p:cNvPr id="151" name="Google Shape;151;p13"/>
-          <p:cNvSpPr txBox="1"/>
-          <p:nvPr/>
-        </p:nvSpPr>
-        <p:spPr>
-          <a:xfrm>
-            <a:off x="1608813" y="3153337"/>
-            <a:ext cx="2188200" cy="276900"/>
-          </a:xfrm>
-          <a:prstGeom prst="rect">
-            <a:avLst/>
-          </a:prstGeom>
-          <a:noFill/>
-          <a:ln>
-            <a:noFill/>
-          </a:ln>
-        </p:spPr>
-        <p:txBody>
-          <a:bodyPr anchorCtr="0" anchor="t" bIns="91425" lIns="91425" spcFirstLastPara="1" rIns="91425" wrap="square" tIns="91425">
-            <a:spAutoFit/>
-          </a:bodyPr>
-          <a:lstStyle/>
-          <a:p>
-            <a:pPr indent="0" lvl="0" marL="0" rtl="0" algn="l">
-              <a:spcBef>
-                <a:spcPts val="0"/>
-              </a:spcBef>
-              <a:spcAft>
-                <a:spcPts val="0"/>
-              </a:spcAft>
-              <a:buNone/>
-            </a:pPr>
-            <a:r>
-              <a:rPr lang="de" sz="600">
-                <a:solidFill>
-                  <a:schemeClr val="dk2"/>
-                </a:solidFill>
-              </a:rPr>
-              <a:t>ARB</a:t>
-            </a:r>
-            <a:endParaRPr sz="600">
-              <a:solidFill>
-                <a:schemeClr val="dk2"/>
-              </a:solidFill>
-            </a:endParaRPr>
-          </a:p>
-        </p:txBody>
-      </p:sp>
       <p:cxnSp>
         <p:nvCxnSpPr>
-          <p:cNvPr id="152" name="Google Shape;152;p13"/>
+          <p:cNvPr id="145" name="Google Shape;145;p13"/>
           <p:cNvCxnSpPr/>
           <p:nvPr/>
         </p:nvCxnSpPr>
@@ -9325,7 +9039,7 @@
       </p:cxnSp>
       <p:cxnSp>
         <p:nvCxnSpPr>
-          <p:cNvPr id="153" name="Google Shape;153;p13"/>
+          <p:cNvPr id="146" name="Google Shape;146;p13"/>
           <p:cNvCxnSpPr/>
           <p:nvPr/>
         </p:nvCxnSpPr>
@@ -9353,7 +9067,7 @@
       </p:cxnSp>
       <p:cxnSp>
         <p:nvCxnSpPr>
-          <p:cNvPr id="154" name="Google Shape;154;p13"/>
+          <p:cNvPr id="147" name="Google Shape;147;p13"/>
           <p:cNvCxnSpPr/>
           <p:nvPr/>
         </p:nvCxnSpPr>
@@ -9381,7 +9095,7 @@
       </p:cxnSp>
       <p:cxnSp>
         <p:nvCxnSpPr>
-          <p:cNvPr id="155" name="Google Shape;155;p13"/>
+          <p:cNvPr id="148" name="Google Shape;148;p13"/>
           <p:cNvCxnSpPr/>
           <p:nvPr/>
         </p:nvCxnSpPr>
@@ -9409,7 +9123,7 @@
       </p:cxnSp>
       <p:sp>
         <p:nvSpPr>
-          <p:cNvPr id="156" name="Google Shape;156;p13"/>
+          <p:cNvPr id="149" name="Google Shape;149;p13"/>
           <p:cNvSpPr/>
           <p:nvPr/>
         </p:nvSpPr>
@@ -9458,9 +9172,9 @@
       </p:sp>
       <p:cxnSp>
         <p:nvCxnSpPr>
-          <p:cNvPr id="157" name="Google Shape;157;p13"/>
+          <p:cNvPr id="150" name="Google Shape;150;p13"/>
           <p:cNvCxnSpPr>
-            <a:stCxn id="156" idx="1"/>
+            <a:stCxn id="149" idx="1"/>
           </p:cNvCxnSpPr>
           <p:nvPr/>
         </p:nvCxnSpPr>
@@ -9488,7 +9202,7 @@
       </p:cxnSp>
       <p:cxnSp>
         <p:nvCxnSpPr>
-          <p:cNvPr id="158" name="Google Shape;158;p13"/>
+          <p:cNvPr id="151" name="Google Shape;151;p13"/>
           <p:cNvCxnSpPr/>
           <p:nvPr/>
         </p:nvCxnSpPr>
@@ -9514,7 +9228,7 @@
       </p:cxnSp>
       <p:sp>
         <p:nvSpPr>
-          <p:cNvPr id="159" name="Google Shape;159;p13"/>
+          <p:cNvPr id="152" name="Google Shape;152;p13"/>
           <p:cNvSpPr txBox="1"/>
           <p:nvPr/>
         </p:nvSpPr>
@@ -9562,6 +9276,288 @@
           </a:p>
         </p:txBody>
       </p:sp>
+      <p:sp>
+        <p:nvSpPr>
+          <p:cNvPr id="153" name="Google Shape;153;p13"/>
+          <p:cNvSpPr txBox="1"/>
+          <p:nvPr/>
+        </p:nvSpPr>
+        <p:spPr>
+          <a:xfrm>
+            <a:off x="519925" y="773650"/>
+            <a:ext cx="474300" cy="223500"/>
+          </a:xfrm>
+          <a:prstGeom prst="rect">
+            <a:avLst/>
+          </a:prstGeom>
+          <a:noFill/>
+          <a:ln>
+            <a:noFill/>
+          </a:ln>
+        </p:spPr>
+        <p:txBody>
+          <a:bodyPr anchorCtr="0" anchor="t" bIns="91425" lIns="91425" spcFirstLastPara="1" rIns="91425" wrap="square" tIns="91425">
+            <a:noAutofit/>
+          </a:bodyPr>
+          <a:lstStyle/>
+          <a:p>
+            <a:pPr indent="0" lvl="0" marL="0" rtl="0" algn="l">
+              <a:spcBef>
+                <a:spcPts val="0"/>
+              </a:spcBef>
+              <a:spcAft>
+                <a:spcPts val="0"/>
+              </a:spcAft>
+              <a:buNone/>
+            </a:pPr>
+            <a:r>
+              <a:t/>
+            </a:r>
+            <a:endParaRPr sz="600">
+              <a:solidFill>
+                <a:schemeClr val="dk2"/>
+              </a:solidFill>
+            </a:endParaRPr>
+          </a:p>
+        </p:txBody>
+      </p:sp>
+      <p:sp>
+        <p:nvSpPr>
+          <p:cNvPr id="154" name="Google Shape;154;p13"/>
+          <p:cNvSpPr/>
+          <p:nvPr/>
+        </p:nvSpPr>
+        <p:spPr>
+          <a:xfrm>
+            <a:off x="594925" y="773650"/>
+            <a:ext cx="399300" cy="399300"/>
+          </a:xfrm>
+          <a:prstGeom prst="rect">
+            <a:avLst/>
+          </a:prstGeom>
+          <a:solidFill>
+            <a:schemeClr val="lt2"/>
+          </a:solidFill>
+          <a:ln cap="flat" cmpd="sng" w="9525">
+            <a:solidFill>
+              <a:schemeClr val="dk2"/>
+            </a:solidFill>
+            <a:prstDash val="solid"/>
+            <a:round/>
+            <a:headEnd len="sm" w="sm" type="none"/>
+            <a:tailEnd len="sm" w="sm" type="none"/>
+          </a:ln>
+        </p:spPr>
+        <p:txBody>
+          <a:bodyPr anchorCtr="0" anchor="ctr" bIns="91425" lIns="91425" spcFirstLastPara="1" rIns="91425" wrap="square" tIns="91425">
+            <a:noAutofit/>
+          </a:bodyPr>
+          <a:lstStyle/>
+          <a:p>
+            <a:pPr indent="0" lvl="0" marL="0" rtl="0" algn="ctr">
+              <a:spcBef>
+                <a:spcPts val="0"/>
+              </a:spcBef>
+              <a:spcAft>
+                <a:spcPts val="0"/>
+              </a:spcAft>
+              <a:buNone/>
+            </a:pPr>
+            <a:r>
+              <a:t/>
+            </a:r>
+            <a:endParaRPr sz="600"/>
+          </a:p>
+        </p:txBody>
+      </p:sp>
+      <p:sp>
+        <p:nvSpPr>
+          <p:cNvPr id="155" name="Google Shape;155;p13"/>
+          <p:cNvSpPr txBox="1"/>
+          <p:nvPr/>
+        </p:nvSpPr>
+        <p:spPr>
+          <a:xfrm>
+            <a:off x="519925" y="717650"/>
+            <a:ext cx="3000000" cy="892800"/>
+          </a:xfrm>
+          <a:prstGeom prst="rect">
+            <a:avLst/>
+          </a:prstGeom>
+          <a:noFill/>
+          <a:ln>
+            <a:noFill/>
+          </a:ln>
+        </p:spPr>
+        <p:txBody>
+          <a:bodyPr anchorCtr="0" anchor="t" bIns="91425" lIns="91425" spcFirstLastPara="1" rIns="91425" wrap="square" tIns="91425">
+            <a:spAutoFit/>
+          </a:bodyPr>
+          <a:lstStyle/>
+          <a:p>
+            <a:pPr indent="0" lvl="0" marL="0" rtl="0" algn="l">
+              <a:spcBef>
+                <a:spcPts val="0"/>
+              </a:spcBef>
+              <a:spcAft>
+                <a:spcPts val="0"/>
+              </a:spcAft>
+              <a:buNone/>
+            </a:pPr>
+            <a:r>
+              <a:rPr lang="de" sz="600"/>
+              <a:t>BRANCH </a:t>
+            </a:r>
+            <a:endParaRPr sz="600"/>
+          </a:p>
+          <a:p>
+            <a:pPr indent="0" lvl="0" marL="0" rtl="0" algn="l">
+              <a:spcBef>
+                <a:spcPts val="0"/>
+              </a:spcBef>
+              <a:spcAft>
+                <a:spcPts val="0"/>
+              </a:spcAft>
+              <a:buNone/>
+            </a:pPr>
+            <a:r>
+              <a:rPr lang="de" sz="600"/>
+              <a:t>PREDIC-</a:t>
+            </a:r>
+            <a:endParaRPr sz="600"/>
+          </a:p>
+          <a:p>
+            <a:pPr indent="0" lvl="0" marL="0" rtl="0" algn="l">
+              <a:spcBef>
+                <a:spcPts val="0"/>
+              </a:spcBef>
+              <a:spcAft>
+                <a:spcPts val="0"/>
+              </a:spcAft>
+              <a:buNone/>
+            </a:pPr>
+            <a:r>
+              <a:rPr lang="de" sz="600"/>
+              <a:t>TOR</a:t>
+            </a:r>
+            <a:endParaRPr sz="600"/>
+          </a:p>
+          <a:p>
+            <a:pPr indent="0" lvl="0" marL="0" rtl="0" algn="l">
+              <a:spcBef>
+                <a:spcPts val="0"/>
+              </a:spcBef>
+              <a:spcAft>
+                <a:spcPts val="0"/>
+              </a:spcAft>
+              <a:buNone/>
+            </a:pPr>
+            <a:r>
+              <a:t/>
+            </a:r>
+            <a:endParaRPr/>
+          </a:p>
+          <a:p>
+            <a:pPr indent="0" lvl="0" marL="0" rtl="0" algn="l">
+              <a:spcBef>
+                <a:spcPts val="0"/>
+              </a:spcBef>
+              <a:spcAft>
+                <a:spcPts val="0"/>
+              </a:spcAft>
+              <a:buNone/>
+            </a:pPr>
+            <a:r>
+              <a:t/>
+            </a:r>
+            <a:endParaRPr/>
+          </a:p>
+        </p:txBody>
+      </p:sp>
+      <p:cxnSp>
+        <p:nvCxnSpPr>
+          <p:cNvPr id="156" name="Google Shape;156;p13"/>
+          <p:cNvCxnSpPr/>
+          <p:nvPr/>
+        </p:nvCxnSpPr>
+        <p:spPr>
+          <a:xfrm rot="10800000">
+            <a:off x="332300" y="922775"/>
+            <a:ext cx="262500" cy="600"/>
+          </a:xfrm>
+          <a:prstGeom prst="bentConnector3">
+            <a:avLst>
+              <a:gd fmla="val 50000" name="adj1"/>
+            </a:avLst>
+          </a:prstGeom>
+          <a:noFill/>
+          <a:ln cap="flat" cmpd="sng" w="9525">
+            <a:solidFill>
+              <a:schemeClr val="dk2"/>
+            </a:solidFill>
+            <a:prstDash val="solid"/>
+            <a:round/>
+            <a:headEnd len="med" w="med" type="none"/>
+            <a:tailEnd len="med" w="med" type="none"/>
+          </a:ln>
+        </p:spPr>
+      </p:cxnSp>
+      <p:cxnSp>
+        <p:nvCxnSpPr>
+          <p:cNvPr id="157" name="Google Shape;157;p13"/>
+          <p:cNvCxnSpPr/>
+          <p:nvPr/>
+        </p:nvCxnSpPr>
+        <p:spPr>
+          <a:xfrm flipH="1" rot="-5400000">
+            <a:off x="-248200" y="1505425"/>
+            <a:ext cx="1167600" cy="2100"/>
+          </a:xfrm>
+          <a:prstGeom prst="bentConnector3">
+            <a:avLst>
+              <a:gd fmla="val 50000" name="adj1"/>
+            </a:avLst>
+          </a:prstGeom>
+          <a:noFill/>
+          <a:ln cap="flat" cmpd="sng" w="9525">
+            <a:solidFill>
+              <a:schemeClr val="dk2"/>
+            </a:solidFill>
+            <a:prstDash val="solid"/>
+            <a:round/>
+            <a:headEnd len="med" w="med" type="none"/>
+            <a:tailEnd len="med" w="med" type="none"/>
+          </a:ln>
+        </p:spPr>
+      </p:cxnSp>
+      <p:cxnSp>
+        <p:nvCxnSpPr>
+          <p:cNvPr id="158" name="Google Shape;158;p13"/>
+          <p:cNvCxnSpPr/>
+          <p:nvPr/>
+        </p:nvCxnSpPr>
+        <p:spPr>
+          <a:xfrm>
+            <a:off x="336675" y="2086125"/>
+            <a:ext cx="57600" cy="2100"/>
+          </a:xfrm>
+          <a:prstGeom prst="bentConnector3">
+            <a:avLst>
+              <a:gd fmla="val 50000" name="adj1"/>
+            </a:avLst>
+          </a:prstGeom>
+          <a:noFill/>
+          <a:ln cap="flat" cmpd="sng" w="9525">
+            <a:solidFill>
+              <a:schemeClr val="dk2"/>
+            </a:solidFill>
+            <a:prstDash val="solid"/>
+            <a:round/>
+            <a:headEnd len="med" w="med" type="none"/>
+            <a:tailEnd len="med" w="med" type="none"/>
+          </a:ln>
+        </p:spPr>
+      </p:cxnSp>
     </p:spTree>
   </p:cSld>
   <p:clrMapOvr>
@@ -9575,7 +9571,7 @@
   <p:cSld>
     <p:spTree>
       <p:nvGrpSpPr>
-        <p:cNvPr id="163" name="Shape 163"/>
+        <p:cNvPr id="162" name="Shape 162"/>
         <p:cNvGrpSpPr/>
         <p:nvPr/>
       </p:nvGrpSpPr>
@@ -9589,7 +9585,7 @@
       </p:grpSpPr>
       <p:sp>
         <p:nvSpPr>
-          <p:cNvPr id="164" name="Google Shape;164;p14"/>
+          <p:cNvPr id="163" name="Google Shape;163;p14"/>
           <p:cNvSpPr txBox="1"/>
           <p:nvPr>
             <p:ph type="title"/>
@@ -9616,6 +9612,45 @@
               </a:spcBef>
               <a:spcAft>
                 <a:spcPts val="0"/>
+              </a:spcAft>
+              <a:buNone/>
+            </a:pPr>
+            <a:r>
+              <a:t/>
+            </a:r>
+            <a:endParaRPr/>
+          </a:p>
+        </p:txBody>
+      </p:sp>
+      <p:sp>
+        <p:nvSpPr>
+          <p:cNvPr id="164" name="Google Shape;164;p14"/>
+          <p:cNvSpPr txBox="1"/>
+          <p:nvPr>
+            <p:ph idx="1" type="body"/>
+          </p:nvPr>
+        </p:nvSpPr>
+        <p:spPr>
+          <a:xfrm>
+            <a:off x="311700" y="1152475"/>
+            <a:ext cx="8520600" cy="3416400"/>
+          </a:xfrm>
+          <a:prstGeom prst="rect">
+            <a:avLst/>
+          </a:prstGeom>
+        </p:spPr>
+        <p:txBody>
+          <a:bodyPr anchorCtr="0" anchor="t" bIns="91425" lIns="91425" spcFirstLastPara="1" rIns="91425" wrap="square" tIns="91425">
+            <a:normAutofit/>
+          </a:bodyPr>
+          <a:lstStyle/>
+          <a:p>
+            <a:pPr indent="0" lvl="0" marL="0" rtl="0" algn="l">
+              <a:spcBef>
+                <a:spcPts val="0"/>
+              </a:spcBef>
+              <a:spcAft>
+                <a:spcPts val="1200"/>
               </a:spcAft>
               <a:buNone/>
             </a:pPr>
@@ -9629,45 +9664,6 @@
       <p:sp>
         <p:nvSpPr>
           <p:cNvPr id="165" name="Google Shape;165;p14"/>
-          <p:cNvSpPr txBox="1"/>
-          <p:nvPr>
-            <p:ph idx="1" type="body"/>
-          </p:nvPr>
-        </p:nvSpPr>
-        <p:spPr>
-          <a:xfrm>
-            <a:off x="311700" y="1152475"/>
-            <a:ext cx="8520600" cy="3416400"/>
-          </a:xfrm>
-          <a:prstGeom prst="rect">
-            <a:avLst/>
-          </a:prstGeom>
-        </p:spPr>
-        <p:txBody>
-          <a:bodyPr anchorCtr="0" anchor="t" bIns="91425" lIns="91425" spcFirstLastPara="1" rIns="91425" wrap="square" tIns="91425">
-            <a:normAutofit/>
-          </a:bodyPr>
-          <a:lstStyle/>
-          <a:p>
-            <a:pPr indent="0" lvl="0" marL="0" rtl="0" algn="l">
-              <a:spcBef>
-                <a:spcPts val="0"/>
-              </a:spcBef>
-              <a:spcAft>
-                <a:spcPts val="1200"/>
-              </a:spcAft>
-              <a:buNone/>
-            </a:pPr>
-            <a:r>
-              <a:t/>
-            </a:r>
-            <a:endParaRPr/>
-          </a:p>
-        </p:txBody>
-      </p:sp>
-      <p:sp>
-        <p:nvSpPr>
-          <p:cNvPr id="166" name="Google Shape;166;p14"/>
           <p:cNvSpPr txBox="1"/>
           <p:nvPr/>
         </p:nvSpPr>
@@ -9746,6 +9742,285 @@
 </file>
 
 <file path=ppt/theme/theme1.xml><?xml version="1.0" encoding="utf-8"?>
+<a:theme xmlns:a="http://schemas.openxmlformats.org/drawingml/2006/main" xmlns:r="http://schemas.openxmlformats.org/officeDocument/2006/relationships">
+  <a:themeElements>
+    <a:clrScheme name="Default">
+      <a:dk1>
+        <a:srgbClr val="000000"/>
+      </a:dk1>
+      <a:lt1>
+        <a:srgbClr val="FFFFFF"/>
+      </a:lt1>
+      <a:dk2>
+        <a:srgbClr val="158158"/>
+      </a:dk2>
+      <a:lt2>
+        <a:srgbClr val="F3F3F3"/>
+      </a:lt2>
+      <a:accent1>
+        <a:srgbClr val="058DC7"/>
+      </a:accent1>
+      <a:accent2>
+        <a:srgbClr val="50B432"/>
+      </a:accent2>
+      <a:accent3>
+        <a:srgbClr val="ED561B"/>
+      </a:accent3>
+      <a:accent4>
+        <a:srgbClr val="EDEF00"/>
+      </a:accent4>
+      <a:accent5>
+        <a:srgbClr val="24CBE5"/>
+      </a:accent5>
+      <a:accent6>
+        <a:srgbClr val="64E572"/>
+      </a:accent6>
+      <a:hlink>
+        <a:srgbClr val="2200CC"/>
+      </a:hlink>
+      <a:folHlink>
+        <a:srgbClr val="551A8B"/>
+      </a:folHlink>
+    </a:clrScheme>
+    <a:fontScheme name="Office">
+      <a:majorFont>
+        <a:latin typeface="Arial"/>
+        <a:ea typeface=""/>
+        <a:cs typeface=""/>
+        <a:font script="Jpan" typeface="ＭＳ Ｐゴシック"/>
+        <a:font script="Hang" typeface="맑은 고딕"/>
+        <a:font script="Hans" typeface="宋体"/>
+        <a:font script="Hant" typeface="新細明體"/>
+        <a:font script="Arab" typeface="Times New Roman"/>
+        <a:font script="Hebr" typeface="Times New Roman"/>
+        <a:font script="Thai" typeface="Angsana New"/>
+        <a:font script="Ethi" typeface="Nyala"/>
+        <a:font script="Beng" typeface="Vrinda"/>
+        <a:font script="Gujr" typeface="Shruti"/>
+        <a:font script="Khmr" typeface="MoolBoran"/>
+        <a:font script="Knda" typeface="Tunga"/>
+        <a:font script="Guru" typeface="Raavi"/>
+        <a:font script="Cans" typeface="Euphemia"/>
+        <a:font script="Cher" typeface="Plantagenet Cherokee"/>
+        <a:font script="Yiii" typeface="Microsoft Yi Baiti"/>
+        <a:font script="Tibt" typeface="Microsoft Himalaya"/>
+        <a:font script="Thaa" typeface="MV Boli"/>
+        <a:font script="Deva" typeface="Mangal"/>
+        <a:font script="Telu" typeface="Gautami"/>
+        <a:font script="Taml" typeface="Latha"/>
+        <a:font script="Syrc" typeface="Estrangelo Edessa"/>
+        <a:font script="Orya" typeface="Kalinga"/>
+        <a:font script="Mlym" typeface="Kartika"/>
+        <a:font script="Laoo" typeface="DokChampa"/>
+        <a:font script="Sinh" typeface="Iskoola Pota"/>
+        <a:font script="Mong" typeface="Mongolian Baiti"/>
+        <a:font script="Viet" typeface="Times New Roman"/>
+        <a:font script="Uigh" typeface="Microsoft Uighur"/>
+        <a:font script="Geor" typeface="Sylfaen"/>
+      </a:majorFont>
+      <a:minorFont>
+        <a:latin typeface="Arial"/>
+        <a:ea typeface=""/>
+        <a:cs typeface=""/>
+        <a:font script="Jpan" typeface="ＭＳ Ｐゴシック"/>
+        <a:font script="Hang" typeface="맑은 고딕"/>
+        <a:font script="Hans" typeface="宋体"/>
+        <a:font script="Hant" typeface="新細明體"/>
+        <a:font script="Arab" typeface="Arial"/>
+        <a:font script="Hebr" typeface="Arial"/>
+        <a:font script="Thai" typeface="Cordia New"/>
+        <a:font script="Ethi" typeface="Nyala"/>
+        <a:font script="Beng" typeface="Vrinda"/>
+        <a:font script="Gujr" typeface="Shruti"/>
+        <a:font script="Khmr" typeface="DaunPenh"/>
+        <a:font script="Knda" typeface="Tunga"/>
+        <a:font script="Guru" typeface="Raavi"/>
+        <a:font script="Cans" typeface="Euphemia"/>
+        <a:font script="Cher" typeface="Plantagenet Cherokee"/>
+        <a:font script="Yiii" typeface="Microsoft Yi Baiti"/>
+        <a:font script="Tibt" typeface="Microsoft Himalaya"/>
+        <a:font script="Thaa" typeface="MV Boli"/>
+        <a:font script="Deva" typeface="Mangal"/>
+        <a:font script="Telu" typeface="Gautami"/>
+        <a:font script="Taml" typeface="Latha"/>
+        <a:font script="Syrc" typeface="Estrangelo Edessa"/>
+        <a:font script="Orya" typeface="Kalinga"/>
+        <a:font script="Mlym" typeface="Kartika"/>
+        <a:font script="Laoo" typeface="DokChampa"/>
+        <a:font script="Sinh" typeface="Iskoola Pota"/>
+        <a:font script="Mong" typeface="Mongolian Baiti"/>
+        <a:font script="Viet" typeface="Arial"/>
+        <a:font script="Uigh" typeface="Microsoft Uighur"/>
+        <a:font script="Geor" typeface="Sylfaen"/>
+      </a:minorFont>
+    </a:fontScheme>
+    <a:fmtScheme name="Office">
+      <a:fillStyleLst>
+        <a:solidFill>
+          <a:schemeClr val="phClr"/>
+        </a:solidFill>
+        <a:gradFill rotWithShape="1">
+          <a:gsLst>
+            <a:gs pos="0">
+              <a:schemeClr val="phClr">
+                <a:tint val="50000"/>
+                <a:satMod val="300000"/>
+              </a:schemeClr>
+            </a:gs>
+            <a:gs pos="35000">
+              <a:schemeClr val="phClr">
+                <a:tint val="37000"/>
+                <a:satMod val="300000"/>
+              </a:schemeClr>
+            </a:gs>
+            <a:gs pos="100000">
+              <a:schemeClr val="phClr">
+                <a:tint val="15000"/>
+                <a:satMod val="350000"/>
+              </a:schemeClr>
+            </a:gs>
+          </a:gsLst>
+          <a:lin ang="16200000" scaled="1"/>
+        </a:gradFill>
+        <a:gradFill rotWithShape="1">
+          <a:gsLst>
+            <a:gs pos="0">
+              <a:schemeClr val="phClr">
+                <a:tint val="100000"/>
+                <a:shade val="100000"/>
+                <a:satMod val="130000"/>
+              </a:schemeClr>
+            </a:gs>
+            <a:gs pos="100000">
+              <a:schemeClr val="phClr">
+                <a:tint val="50000"/>
+                <a:shade val="100000"/>
+                <a:satMod val="350000"/>
+              </a:schemeClr>
+            </a:gs>
+          </a:gsLst>
+          <a:lin ang="16200000" scaled="0"/>
+        </a:gradFill>
+      </a:fillStyleLst>
+      <a:lnStyleLst>
+        <a:ln w="9525" cap="flat" cmpd="sng" algn="ctr">
+          <a:solidFill>
+            <a:schemeClr val="phClr">
+              <a:shade val="95000"/>
+              <a:satMod val="105000"/>
+            </a:schemeClr>
+          </a:solidFill>
+          <a:prstDash val="solid"/>
+        </a:ln>
+        <a:ln w="25400" cap="flat" cmpd="sng" algn="ctr">
+          <a:solidFill>
+            <a:schemeClr val="phClr"/>
+          </a:solidFill>
+          <a:prstDash val="solid"/>
+        </a:ln>
+        <a:ln w="38100" cap="flat" cmpd="sng" algn="ctr">
+          <a:solidFill>
+            <a:schemeClr val="phClr"/>
+          </a:solidFill>
+          <a:prstDash val="solid"/>
+        </a:ln>
+      </a:lnStyleLst>
+      <a:effectStyleLst>
+        <a:effectStyle>
+          <a:effectLst>
+            <a:outerShdw blurRad="40000" dist="20000" dir="5400000" rotWithShape="0">
+              <a:srgbClr val="000000">
+                <a:alpha val="38000"/>
+              </a:srgbClr>
+            </a:outerShdw>
+          </a:effectLst>
+        </a:effectStyle>
+        <a:effectStyle>
+          <a:effectLst>
+            <a:outerShdw blurRad="40000" dist="23000" dir="5400000" rotWithShape="0">
+              <a:srgbClr val="000000">
+                <a:alpha val="35000"/>
+              </a:srgbClr>
+            </a:outerShdw>
+          </a:effectLst>
+        </a:effectStyle>
+        <a:effectStyle>
+          <a:effectLst>
+            <a:outerShdw blurRad="40000" dist="23000" dir="5400000" rotWithShape="0">
+              <a:srgbClr val="000000">
+                <a:alpha val="35000"/>
+              </a:srgbClr>
+            </a:outerShdw>
+          </a:effectLst>
+          <a:scene3d>
+            <a:camera prst="orthographicFront">
+              <a:rot lat="0" lon="0" rev="0"/>
+            </a:camera>
+            <a:lightRig rig="threePt" dir="t">
+              <a:rot lat="0" lon="0" rev="1200000"/>
+            </a:lightRig>
+          </a:scene3d>
+          <a:sp3d>
+            <a:bevelT w="63500" h="25400"/>
+          </a:sp3d>
+        </a:effectStyle>
+      </a:effectStyleLst>
+      <a:bgFillStyleLst>
+        <a:solidFill>
+          <a:schemeClr val="phClr"/>
+        </a:solidFill>
+        <a:gradFill rotWithShape="1">
+          <a:gsLst>
+            <a:gs pos="0">
+              <a:schemeClr val="phClr">
+                <a:tint val="40000"/>
+                <a:satMod val="350000"/>
+              </a:schemeClr>
+            </a:gs>
+            <a:gs pos="40000">
+              <a:schemeClr val="phClr">
+                <a:tint val="45000"/>
+                <a:shade val="99000"/>
+                <a:satMod val="350000"/>
+              </a:schemeClr>
+            </a:gs>
+            <a:gs pos="100000">
+              <a:schemeClr val="phClr">
+                <a:shade val="20000"/>
+                <a:satMod val="255000"/>
+              </a:schemeClr>
+            </a:gs>
+          </a:gsLst>
+          <a:path path="circle">
+            <a:fillToRect l="50000" t="-80000" r="50000" b="180000"/>
+          </a:path>
+        </a:gradFill>
+        <a:gradFill rotWithShape="1">
+          <a:gsLst>
+            <a:gs pos="0">
+              <a:schemeClr val="phClr">
+                <a:tint val="80000"/>
+                <a:satMod val="300000"/>
+              </a:schemeClr>
+            </a:gs>
+            <a:gs pos="100000">
+              <a:schemeClr val="phClr">
+                <a:shade val="30000"/>
+                <a:satMod val="200000"/>
+              </a:schemeClr>
+            </a:gs>
+          </a:gsLst>
+          <a:path path="circle">
+            <a:fillToRect l="50000" t="50000" r="50000" b="50000"/>
+          </a:path>
+        </a:gradFill>
+      </a:bgFillStyleLst>
+    </a:fmtScheme>
+  </a:themeElements>
+</a:theme>
+</file>
+
+<file path=ppt/theme/theme2.xml><?xml version="1.0" encoding="utf-8"?>
 <a:theme xmlns:a="http://schemas.openxmlformats.org/drawingml/2006/main" xmlns:r="http://schemas.openxmlformats.org/officeDocument/2006/relationships" name="Simple Light">
   <a:themeElements>
     <a:clrScheme name="Simple Light">
@@ -10022,283 +10297,4 @@
     </a:fmtScheme>
   </a:themeElements>
 </a:theme>
-</file>
-
-<file path=ppt/theme/theme2.xml><?xml version="1.0" encoding="utf-8"?>
-<a:theme xmlns:a="http://schemas.openxmlformats.org/drawingml/2006/main" xmlns:r="http://schemas.openxmlformats.org/officeDocument/2006/relationships">
-  <a:themeElements>
-    <a:clrScheme name="Default">
-      <a:dk1>
-        <a:srgbClr val="000000"/>
-      </a:dk1>
-      <a:lt1>
-        <a:srgbClr val="FFFFFF"/>
-      </a:lt1>
-      <a:dk2>
-        <a:srgbClr val="158158"/>
-      </a:dk2>
-      <a:lt2>
-        <a:srgbClr val="F3F3F3"/>
-      </a:lt2>
-      <a:accent1>
-        <a:srgbClr val="058DC7"/>
-      </a:accent1>
-      <a:accent2>
-        <a:srgbClr val="50B432"/>
-      </a:accent2>
-      <a:accent3>
-        <a:srgbClr val="ED561B"/>
-      </a:accent3>
-      <a:accent4>
-        <a:srgbClr val="EDEF00"/>
-      </a:accent4>
-      <a:accent5>
-        <a:srgbClr val="24CBE5"/>
-      </a:accent5>
-      <a:accent6>
-        <a:srgbClr val="64E572"/>
-      </a:accent6>
-      <a:hlink>
-        <a:srgbClr val="2200CC"/>
-      </a:hlink>
-      <a:folHlink>
-        <a:srgbClr val="551A8B"/>
-      </a:folHlink>
-    </a:clrScheme>
-    <a:fontScheme name="Office">
-      <a:majorFont>
-        <a:latin typeface="Arial"/>
-        <a:ea typeface=""/>
-        <a:cs typeface=""/>
-        <a:font script="Jpan" typeface="ＭＳ Ｐゴシック"/>
-        <a:font script="Hang" typeface="맑은 고딕"/>
-        <a:font script="Hans" typeface="宋体"/>
-        <a:font script="Hant" typeface="新細明體"/>
-        <a:font script="Arab" typeface="Times New Roman"/>
-        <a:font script="Hebr" typeface="Times New Roman"/>
-        <a:font script="Thai" typeface="Angsana New"/>
-        <a:font script="Ethi" typeface="Nyala"/>
-        <a:font script="Beng" typeface="Vrinda"/>
-        <a:font script="Gujr" typeface="Shruti"/>
-        <a:font script="Khmr" typeface="MoolBoran"/>
-        <a:font script="Knda" typeface="Tunga"/>
-        <a:font script="Guru" typeface="Raavi"/>
-        <a:font script="Cans" typeface="Euphemia"/>
-        <a:font script="Cher" typeface="Plantagenet Cherokee"/>
-        <a:font script="Yiii" typeface="Microsoft Yi Baiti"/>
-        <a:font script="Tibt" typeface="Microsoft Himalaya"/>
-        <a:font script="Thaa" typeface="MV Boli"/>
-        <a:font script="Deva" typeface="Mangal"/>
-        <a:font script="Telu" typeface="Gautami"/>
-        <a:font script="Taml" typeface="Latha"/>
-        <a:font script="Syrc" typeface="Estrangelo Edessa"/>
-        <a:font script="Orya" typeface="Kalinga"/>
-        <a:font script="Mlym" typeface="Kartika"/>
-        <a:font script="Laoo" typeface="DokChampa"/>
-        <a:font script="Sinh" typeface="Iskoola Pota"/>
-        <a:font script="Mong" typeface="Mongolian Baiti"/>
-        <a:font script="Viet" typeface="Times New Roman"/>
-        <a:font script="Uigh" typeface="Microsoft Uighur"/>
-        <a:font script="Geor" typeface="Sylfaen"/>
-      </a:majorFont>
-      <a:minorFont>
-        <a:latin typeface="Arial"/>
-        <a:ea typeface=""/>
-        <a:cs typeface=""/>
-        <a:font script="Jpan" typeface="ＭＳ Ｐゴシック"/>
-        <a:font script="Hang" typeface="맑은 고딕"/>
-        <a:font script="Hans" typeface="宋体"/>
-        <a:font script="Hant" typeface="新細明體"/>
-        <a:font script="Arab" typeface="Arial"/>
-        <a:font script="Hebr" typeface="Arial"/>
-        <a:font script="Thai" typeface="Cordia New"/>
-        <a:font script="Ethi" typeface="Nyala"/>
-        <a:font script="Beng" typeface="Vrinda"/>
-        <a:font script="Gujr" typeface="Shruti"/>
-        <a:font script="Khmr" typeface="DaunPenh"/>
-        <a:font script="Knda" typeface="Tunga"/>
-        <a:font script="Guru" typeface="Raavi"/>
-        <a:font script="Cans" typeface="Euphemia"/>
-        <a:font script="Cher" typeface="Plantagenet Cherokee"/>
-        <a:font script="Yiii" typeface="Microsoft Yi Baiti"/>
-        <a:font script="Tibt" typeface="Microsoft Himalaya"/>
-        <a:font script="Thaa" typeface="MV Boli"/>
-        <a:font script="Deva" typeface="Mangal"/>
-        <a:font script="Telu" typeface="Gautami"/>
-        <a:font script="Taml" typeface="Latha"/>
-        <a:font script="Syrc" typeface="Estrangelo Edessa"/>
-        <a:font script="Orya" typeface="Kalinga"/>
-        <a:font script="Mlym" typeface="Kartika"/>
-        <a:font script="Laoo" typeface="DokChampa"/>
-        <a:font script="Sinh" typeface="Iskoola Pota"/>
-        <a:font script="Mong" typeface="Mongolian Baiti"/>
-        <a:font script="Viet" typeface="Arial"/>
-        <a:font script="Uigh" typeface="Microsoft Uighur"/>
-        <a:font script="Geor" typeface="Sylfaen"/>
-      </a:minorFont>
-    </a:fontScheme>
-    <a:fmtScheme name="Office">
-      <a:fillStyleLst>
-        <a:solidFill>
-          <a:schemeClr val="phClr"/>
-        </a:solidFill>
-        <a:gradFill rotWithShape="1">
-          <a:gsLst>
-            <a:gs pos="0">
-              <a:schemeClr val="phClr">
-                <a:tint val="50000"/>
-                <a:satMod val="300000"/>
-              </a:schemeClr>
-            </a:gs>
-            <a:gs pos="35000">
-              <a:schemeClr val="phClr">
-                <a:tint val="37000"/>
-                <a:satMod val="300000"/>
-              </a:schemeClr>
-            </a:gs>
-            <a:gs pos="100000">
-              <a:schemeClr val="phClr">
-                <a:tint val="15000"/>
-                <a:satMod val="350000"/>
-              </a:schemeClr>
-            </a:gs>
-          </a:gsLst>
-          <a:lin ang="16200000" scaled="1"/>
-        </a:gradFill>
-        <a:gradFill rotWithShape="1">
-          <a:gsLst>
-            <a:gs pos="0">
-              <a:schemeClr val="phClr">
-                <a:tint val="100000"/>
-                <a:shade val="100000"/>
-                <a:satMod val="130000"/>
-              </a:schemeClr>
-            </a:gs>
-            <a:gs pos="100000">
-              <a:schemeClr val="phClr">
-                <a:tint val="50000"/>
-                <a:shade val="100000"/>
-                <a:satMod val="350000"/>
-              </a:schemeClr>
-            </a:gs>
-          </a:gsLst>
-          <a:lin ang="16200000" scaled="0"/>
-        </a:gradFill>
-      </a:fillStyleLst>
-      <a:lnStyleLst>
-        <a:ln w="9525" cap="flat" cmpd="sng" algn="ctr">
-          <a:solidFill>
-            <a:schemeClr val="phClr">
-              <a:shade val="95000"/>
-              <a:satMod val="105000"/>
-            </a:schemeClr>
-          </a:solidFill>
-          <a:prstDash val="solid"/>
-        </a:ln>
-        <a:ln w="25400" cap="flat" cmpd="sng" algn="ctr">
-          <a:solidFill>
-            <a:schemeClr val="phClr"/>
-          </a:solidFill>
-          <a:prstDash val="solid"/>
-        </a:ln>
-        <a:ln w="38100" cap="flat" cmpd="sng" algn="ctr">
-          <a:solidFill>
-            <a:schemeClr val="phClr"/>
-          </a:solidFill>
-          <a:prstDash val="solid"/>
-        </a:ln>
-      </a:lnStyleLst>
-      <a:effectStyleLst>
-        <a:effectStyle>
-          <a:effectLst>
-            <a:outerShdw blurRad="40000" dist="20000" dir="5400000" rotWithShape="0">
-              <a:srgbClr val="000000">
-                <a:alpha val="38000"/>
-              </a:srgbClr>
-            </a:outerShdw>
-          </a:effectLst>
-        </a:effectStyle>
-        <a:effectStyle>
-          <a:effectLst>
-            <a:outerShdw blurRad="40000" dist="23000" dir="5400000" rotWithShape="0">
-              <a:srgbClr val="000000">
-                <a:alpha val="35000"/>
-              </a:srgbClr>
-            </a:outerShdw>
-          </a:effectLst>
-        </a:effectStyle>
-        <a:effectStyle>
-          <a:effectLst>
-            <a:outerShdw blurRad="40000" dist="23000" dir="5400000" rotWithShape="0">
-              <a:srgbClr val="000000">
-                <a:alpha val="35000"/>
-              </a:srgbClr>
-            </a:outerShdw>
-          </a:effectLst>
-          <a:scene3d>
-            <a:camera prst="orthographicFront">
-              <a:rot lat="0" lon="0" rev="0"/>
-            </a:camera>
-            <a:lightRig rig="threePt" dir="t">
-              <a:rot lat="0" lon="0" rev="1200000"/>
-            </a:lightRig>
-          </a:scene3d>
-          <a:sp3d>
-            <a:bevelT w="63500" h="25400"/>
-          </a:sp3d>
-        </a:effectStyle>
-      </a:effectStyleLst>
-      <a:bgFillStyleLst>
-        <a:solidFill>
-          <a:schemeClr val="phClr"/>
-        </a:solidFill>
-        <a:gradFill rotWithShape="1">
-          <a:gsLst>
-            <a:gs pos="0">
-              <a:schemeClr val="phClr">
-                <a:tint val="40000"/>
-                <a:satMod val="350000"/>
-              </a:schemeClr>
-            </a:gs>
-            <a:gs pos="40000">
-              <a:schemeClr val="phClr">
-                <a:tint val="45000"/>
-                <a:shade val="99000"/>
-                <a:satMod val="350000"/>
-              </a:schemeClr>
-            </a:gs>
-            <a:gs pos="100000">
-              <a:schemeClr val="phClr">
-                <a:shade val="20000"/>
-                <a:satMod val="255000"/>
-              </a:schemeClr>
-            </a:gs>
-          </a:gsLst>
-          <a:path path="circle">
-            <a:fillToRect l="50000" t="-80000" r="50000" b="180000"/>
-          </a:path>
-        </a:gradFill>
-        <a:gradFill rotWithShape="1">
-          <a:gsLst>
-            <a:gs pos="0">
-              <a:schemeClr val="phClr">
-                <a:tint val="80000"/>
-                <a:satMod val="300000"/>
-              </a:schemeClr>
-            </a:gs>
-            <a:gs pos="100000">
-              <a:schemeClr val="phClr">
-                <a:shade val="30000"/>
-                <a:satMod val="200000"/>
-              </a:schemeClr>
-            </a:gs>
-          </a:gsLst>
-          <a:path path="circle">
-            <a:fillToRect l="50000" t="50000" r="50000" b="50000"/>
-          </a:path>
-        </a:gradFill>
-      </a:bgFillStyleLst>
-    </a:fmtScheme>
-  </a:themeElements>
-</a:theme>
 </file>
</xml_diff>